<commit_message>
Edited topic, recreated diagrams
</commit_message>
<xml_diff>
--- a/power-platform/admin/security/media/Diagrams.pptx
+++ b/power-platform/admin/security/media/Diagrams.pptx
@@ -8,6 +8,8 @@
     <p:sldId id="256" r:id="rId2"/>
     <p:sldId id="257" r:id="rId3"/>
     <p:sldId id="258" r:id="rId4"/>
+    <p:sldId id="259" r:id="rId5"/>
+    <p:sldId id="260" r:id="rId6"/>
   </p:sldIdLst>
   <p:sldSz cx="12192000" cy="6858000"/>
   <p:notesSz cx="6858000" cy="9144000"/>
@@ -106,6 +108,11 @@
       </a:defRPr>
     </a:lvl9pPr>
   </p:defaultTextStyle>
+  <p:extLst>
+    <p:ext uri="{EFAFB233-063F-42B5-8137-9DF3F51BA10A}">
+      <p15:sldGuideLst xmlns:p15="http://schemas.microsoft.com/office/powerpoint/2012/main"/>
+    </p:ext>
+  </p:extLst>
 </p:presentation>
 </file>
 
@@ -5304,124 +5311,200 @@
           </p:spPr>
         </p:pic>
       </p:grpSp>
-      <p:grpSp>
-        <p:nvGrpSpPr>
-          <p:cNvPr id="116" name="Group 115">
-            <a:extLst>
-              <a:ext uri="{FF2B5EF4-FFF2-40B4-BE49-F238E27FC236}">
-                <a16:creationId xmlns:a16="http://schemas.microsoft.com/office/drawing/2014/main" id="{79CA33E0-7F5F-4B7E-83EE-9194A5359020}"/>
-              </a:ext>
-            </a:extLst>
-          </p:cNvPr>
-          <p:cNvGrpSpPr/>
-          <p:nvPr/>
-        </p:nvGrpSpPr>
-        <p:grpSpPr>
+      <p:sp>
+        <p:nvSpPr>
+          <p:cNvPr id="112" name="Rectangle 111">
+            <a:extLst>
+              <a:ext uri="{FF2B5EF4-FFF2-40B4-BE49-F238E27FC236}">
+                <a16:creationId xmlns:a16="http://schemas.microsoft.com/office/drawing/2014/main" id="{1C97F7C3-122C-47A5-A239-08B0F20D04AA}"/>
+              </a:ext>
+            </a:extLst>
+          </p:cNvPr>
+          <p:cNvSpPr/>
+          <p:nvPr/>
+        </p:nvSpPr>
+        <p:spPr>
           <a:xfrm>
             <a:off x="5965959" y="3185935"/>
             <a:ext cx="4539481" cy="2915145"/>
-            <a:chOff x="5142999" y="3229938"/>
-            <a:chExt cx="4539481" cy="2915145"/>
-          </a:xfrm>
-        </p:grpSpPr>
-        <p:sp>
-          <p:nvSpPr>
-            <p:cNvPr id="112" name="Rectangle 111">
-              <a:extLst>
-                <a:ext uri="{FF2B5EF4-FFF2-40B4-BE49-F238E27FC236}">
-                  <a16:creationId xmlns:a16="http://schemas.microsoft.com/office/drawing/2014/main" id="{1C97F7C3-122C-47A5-A239-08B0F20D04AA}"/>
-                </a:ext>
-              </a:extLst>
-            </p:cNvPr>
-            <p:cNvSpPr/>
-            <p:nvPr/>
-          </p:nvSpPr>
-          <p:spPr>
-            <a:xfrm>
-              <a:off x="5142999" y="3229938"/>
-              <a:ext cx="4539481" cy="2915145"/>
-            </a:xfrm>
-            <a:prstGeom prst="rect">
-              <a:avLst/>
-            </a:prstGeom>
-          </p:spPr>
-          <p:style>
-            <a:lnRef idx="2">
-              <a:schemeClr val="accent1">
-                <a:shade val="50000"/>
-              </a:schemeClr>
-            </a:lnRef>
-            <a:fillRef idx="1">
-              <a:schemeClr val="accent1"/>
-            </a:fillRef>
-            <a:effectRef idx="0">
-              <a:schemeClr val="accent1"/>
-            </a:effectRef>
-            <a:fontRef idx="minor">
-              <a:schemeClr val="lt1"/>
-            </a:fontRef>
-          </p:style>
-          <p:txBody>
-            <a:bodyPr rtlCol="0" anchor="ctr"/>
-            <a:lstStyle/>
-            <a:p>
-              <a:pPr algn="ctr"/>
-              <a:endParaRPr lang="en-US"/>
-            </a:p>
-          </p:txBody>
-        </p:sp>
-        <p:sp>
-          <p:nvSpPr>
-            <p:cNvPr id="114" name="TextBox 113">
-              <a:extLst>
-                <a:ext uri="{FF2B5EF4-FFF2-40B4-BE49-F238E27FC236}">
-                  <a16:creationId xmlns:a16="http://schemas.microsoft.com/office/drawing/2014/main" id="{A380DB4D-3EA4-48D3-93BB-3F65B8C5CCE2}"/>
-                </a:ext>
-              </a:extLst>
-            </p:cNvPr>
-            <p:cNvSpPr txBox="1"/>
-            <p:nvPr/>
-          </p:nvSpPr>
-          <p:spPr>
-            <a:xfrm>
-              <a:off x="6147527" y="4389544"/>
-              <a:ext cx="2551266" cy="646331"/>
-            </a:xfrm>
-            <a:prstGeom prst="rect">
-              <a:avLst/>
-            </a:prstGeom>
-            <a:noFill/>
-          </p:spPr>
-          <p:txBody>
-            <a:bodyPr wrap="square" rtlCol="0">
-              <a:spAutoFit/>
-            </a:bodyPr>
-            <a:lstStyle/>
-            <a:p>
-              <a:pPr algn="ctr"/>
-              <a:r>
-                <a:rPr lang="en-US" dirty="0">
-                  <a:solidFill>
-                    <a:schemeClr val="bg2"/>
-                  </a:solidFill>
-                </a:rPr>
-                <a:t>Back-End Services</a:t>
-              </a:r>
-            </a:p>
-            <a:p>
-              <a:pPr algn="ctr"/>
-              <a:r>
-                <a:rPr lang="en-US" dirty="0">
-                  <a:solidFill>
-                    <a:schemeClr val="bg2"/>
-                  </a:solidFill>
-                </a:rPr>
-                <a:t>(private)</a:t>
-              </a:r>
-            </a:p>
-          </p:txBody>
-        </p:sp>
-      </p:grpSp>
+          </a:xfrm>
+          <a:prstGeom prst="rect">
+            <a:avLst/>
+          </a:prstGeom>
+        </p:spPr>
+        <p:style>
+          <a:lnRef idx="2">
+            <a:schemeClr val="accent1">
+              <a:shade val="50000"/>
+            </a:schemeClr>
+          </a:lnRef>
+          <a:fillRef idx="1">
+            <a:schemeClr val="accent1"/>
+          </a:fillRef>
+          <a:effectRef idx="0">
+            <a:schemeClr val="accent1"/>
+          </a:effectRef>
+          <a:fontRef idx="minor">
+            <a:schemeClr val="lt1"/>
+          </a:fontRef>
+        </p:style>
+        <p:txBody>
+          <a:bodyPr rtlCol="0" anchor="ctr"/>
+          <a:lstStyle/>
+          <a:p>
+            <a:pPr algn="ctr"/>
+            <a:endParaRPr lang="en-US"/>
+          </a:p>
+        </p:txBody>
+      </p:sp>
+      <p:sp>
+        <p:nvSpPr>
+          <p:cNvPr id="114" name="TextBox 113">
+            <a:extLst>
+              <a:ext uri="{FF2B5EF4-FFF2-40B4-BE49-F238E27FC236}">
+                <a16:creationId xmlns:a16="http://schemas.microsoft.com/office/drawing/2014/main" id="{A380DB4D-3EA4-48D3-93BB-3F65B8C5CCE2}"/>
+              </a:ext>
+            </a:extLst>
+          </p:cNvPr>
+          <p:cNvSpPr txBox="1"/>
+          <p:nvPr/>
+        </p:nvSpPr>
+        <p:spPr>
+          <a:xfrm>
+            <a:off x="6970487" y="4345541"/>
+            <a:ext cx="2551266" cy="646331"/>
+          </a:xfrm>
+          <a:prstGeom prst="rect">
+            <a:avLst/>
+          </a:prstGeom>
+          <a:noFill/>
+        </p:spPr>
+        <p:txBody>
+          <a:bodyPr wrap="square" rtlCol="0">
+            <a:spAutoFit/>
+          </a:bodyPr>
+          <a:lstStyle/>
+          <a:p>
+            <a:pPr algn="ctr"/>
+            <a:r>
+              <a:rPr lang="en-US" dirty="0">
+                <a:solidFill>
+                  <a:schemeClr val="bg2"/>
+                </a:solidFill>
+              </a:rPr>
+              <a:t>Back-End Services</a:t>
+            </a:r>
+          </a:p>
+          <a:p>
+            <a:pPr algn="ctr"/>
+            <a:r>
+              <a:rPr lang="en-US" dirty="0">
+                <a:solidFill>
+                  <a:schemeClr val="bg2"/>
+                </a:solidFill>
+              </a:rPr>
+              <a:t>(private)</a:t>
+            </a:r>
+          </a:p>
+        </p:txBody>
+      </p:sp>
+      <p:sp>
+        <p:nvSpPr>
+          <p:cNvPr id="54" name="Rectangle 53">
+            <a:extLst>
+              <a:ext uri="{FF2B5EF4-FFF2-40B4-BE49-F238E27FC236}">
+                <a16:creationId xmlns:a16="http://schemas.microsoft.com/office/drawing/2014/main" id="{01863BB5-7E1B-4900-9546-6641492FDDE3}"/>
+              </a:ext>
+            </a:extLst>
+          </p:cNvPr>
+          <p:cNvSpPr/>
+          <p:nvPr/>
+        </p:nvSpPr>
+        <p:spPr>
+          <a:xfrm>
+            <a:off x="5965959" y="3213484"/>
+            <a:ext cx="4539481" cy="2915145"/>
+          </a:xfrm>
+          <a:prstGeom prst="rect">
+            <a:avLst/>
+          </a:prstGeom>
+        </p:spPr>
+        <p:style>
+          <a:lnRef idx="2">
+            <a:schemeClr val="accent1">
+              <a:shade val="50000"/>
+            </a:schemeClr>
+          </a:lnRef>
+          <a:fillRef idx="1">
+            <a:schemeClr val="accent1"/>
+          </a:fillRef>
+          <a:effectRef idx="0">
+            <a:schemeClr val="accent1"/>
+          </a:effectRef>
+          <a:fontRef idx="minor">
+            <a:schemeClr val="lt1"/>
+          </a:fontRef>
+        </p:style>
+        <p:txBody>
+          <a:bodyPr rtlCol="0" anchor="ctr"/>
+          <a:lstStyle/>
+          <a:p>
+            <a:pPr algn="ctr"/>
+            <a:endParaRPr lang="en-US"/>
+          </a:p>
+        </p:txBody>
+      </p:sp>
+      <p:sp>
+        <p:nvSpPr>
+          <p:cNvPr id="56" name="TextBox 55">
+            <a:extLst>
+              <a:ext uri="{FF2B5EF4-FFF2-40B4-BE49-F238E27FC236}">
+                <a16:creationId xmlns:a16="http://schemas.microsoft.com/office/drawing/2014/main" id="{2A1CE073-F866-4D52-8D54-C773B224F372}"/>
+              </a:ext>
+            </a:extLst>
+          </p:cNvPr>
+          <p:cNvSpPr txBox="1"/>
+          <p:nvPr/>
+        </p:nvSpPr>
+        <p:spPr>
+          <a:xfrm>
+            <a:off x="6970487" y="4373090"/>
+            <a:ext cx="2551266" cy="646331"/>
+          </a:xfrm>
+          <a:prstGeom prst="rect">
+            <a:avLst/>
+          </a:prstGeom>
+          <a:noFill/>
+        </p:spPr>
+        <p:txBody>
+          <a:bodyPr wrap="square" rtlCol="0">
+            <a:spAutoFit/>
+          </a:bodyPr>
+          <a:lstStyle/>
+          <a:p>
+            <a:pPr algn="ctr"/>
+            <a:r>
+              <a:rPr lang="en-US" dirty="0">
+                <a:solidFill>
+                  <a:schemeClr val="bg2"/>
+                </a:solidFill>
+              </a:rPr>
+              <a:t>Back-End Services</a:t>
+            </a:r>
+          </a:p>
+          <a:p>
+            <a:pPr algn="ctr"/>
+            <a:r>
+              <a:rPr lang="en-US" dirty="0">
+                <a:solidFill>
+                  <a:schemeClr val="bg2"/>
+                </a:solidFill>
+              </a:rPr>
+              <a:t>(private)</a:t>
+            </a:r>
+          </a:p>
+        </p:txBody>
+      </p:sp>
       <p:sp>
         <p:nvSpPr>
           <p:cNvPr id="118" name="Arrow: Right 117">
@@ -8205,6 +8288,2311 @@
     <p:extLst>
       <p:ext uri="{BB962C8B-B14F-4D97-AF65-F5344CB8AC3E}">
         <p14:creationId xmlns:p14="http://schemas.microsoft.com/office/powerpoint/2010/main" val="2783077150"/>
+      </p:ext>
+    </p:extLst>
+  </p:cSld>
+  <p:clrMapOvr>
+    <a:masterClrMapping/>
+  </p:clrMapOvr>
+</p:sld>
+</file>
+
+<file path=ppt/slides/slide4.xml><?xml version="1.0" encoding="utf-8"?>
+<p:sld xmlns:a="http://schemas.openxmlformats.org/drawingml/2006/main" xmlns:r="http://schemas.openxmlformats.org/officeDocument/2006/relationships" xmlns:p="http://schemas.openxmlformats.org/presentationml/2006/main">
+  <p:cSld>
+    <p:bg>
+      <p:bgPr>
+        <a:solidFill>
+          <a:schemeClr val="bg2"/>
+        </a:solidFill>
+        <a:effectLst/>
+      </p:bgPr>
+    </p:bg>
+    <p:spTree>
+      <p:nvGrpSpPr>
+        <p:cNvPr id="1" name=""/>
+        <p:cNvGrpSpPr/>
+        <p:nvPr/>
+      </p:nvGrpSpPr>
+      <p:grpSpPr>
+        <a:xfrm>
+          <a:off x="0" y="0"/>
+          <a:ext cx="0" cy="0"/>
+          <a:chOff x="0" y="0"/>
+          <a:chExt cx="0" cy="0"/>
+        </a:xfrm>
+      </p:grpSpPr>
+      <p:grpSp>
+        <p:nvGrpSpPr>
+          <p:cNvPr id="12" name="Group 11">
+            <a:extLst>
+              <a:ext uri="{FF2B5EF4-FFF2-40B4-BE49-F238E27FC236}">
+                <a16:creationId xmlns:a16="http://schemas.microsoft.com/office/drawing/2014/main" id="{11715A23-91BC-4549-BC4C-88D07F402E54}"/>
+              </a:ext>
+            </a:extLst>
+          </p:cNvPr>
+          <p:cNvGrpSpPr/>
+          <p:nvPr/>
+        </p:nvGrpSpPr>
+        <p:grpSpPr>
+          <a:xfrm>
+            <a:off x="182647" y="524634"/>
+            <a:ext cx="8161253" cy="4118437"/>
+            <a:chOff x="182647" y="524634"/>
+            <a:chExt cx="8161253" cy="4118437"/>
+          </a:xfrm>
+        </p:grpSpPr>
+        <p:pic>
+          <p:nvPicPr>
+            <p:cNvPr id="3" name="Picture 2" descr="Graphical user interface, application, PowerPoint&#10;&#10;Description automatically generated">
+              <a:extLst>
+                <a:ext uri="{FF2B5EF4-FFF2-40B4-BE49-F238E27FC236}">
+                  <a16:creationId xmlns:a16="http://schemas.microsoft.com/office/drawing/2014/main" id="{432C91AB-950A-4DB1-9528-CCE48DC8ADDA}"/>
+                </a:ext>
+              </a:extLst>
+            </p:cNvPr>
+            <p:cNvPicPr>
+              <a:picLocks noChangeAspect="1"/>
+            </p:cNvPicPr>
+            <p:nvPr/>
+          </p:nvPicPr>
+          <p:blipFill rotWithShape="1">
+            <a:blip r:embed="rId2">
+              <a:extLst>
+                <a:ext uri="{28A0092B-C50C-407E-A947-70E740481C1C}">
+                  <a14:useLocalDpi xmlns:a14="http://schemas.microsoft.com/office/drawing/2010/main" val="0"/>
+                </a:ext>
+              </a:extLst>
+            </a:blip>
+            <a:srcRect l="9918"/>
+            <a:stretch/>
+          </p:blipFill>
+          <p:spPr>
+            <a:xfrm>
+              <a:off x="182647" y="524634"/>
+              <a:ext cx="6595559" cy="4118437"/>
+            </a:xfrm>
+            <a:prstGeom prst="rect">
+              <a:avLst/>
+            </a:prstGeom>
+          </p:spPr>
+        </p:pic>
+        <p:sp>
+          <p:nvSpPr>
+            <p:cNvPr id="10" name="Rectangle 9">
+              <a:extLst>
+                <a:ext uri="{FF2B5EF4-FFF2-40B4-BE49-F238E27FC236}">
+                  <a16:creationId xmlns:a16="http://schemas.microsoft.com/office/drawing/2014/main" id="{8F094156-F6E5-4360-B6CB-61C7CF6CDE0B}"/>
+                </a:ext>
+              </a:extLst>
+            </p:cNvPr>
+            <p:cNvSpPr/>
+            <p:nvPr/>
+          </p:nvSpPr>
+          <p:spPr>
+            <a:xfrm>
+              <a:off x="6778206" y="524634"/>
+              <a:ext cx="1565694" cy="4118437"/>
+            </a:xfrm>
+            <a:prstGeom prst="rect">
+              <a:avLst/>
+            </a:prstGeom>
+            <a:solidFill>
+              <a:srgbClr val="DAE3F3"/>
+            </a:solidFill>
+            <a:ln>
+              <a:noFill/>
+            </a:ln>
+          </p:spPr>
+          <p:style>
+            <a:lnRef idx="2">
+              <a:schemeClr val="accent1">
+                <a:shade val="50000"/>
+              </a:schemeClr>
+            </a:lnRef>
+            <a:fillRef idx="1">
+              <a:schemeClr val="accent1"/>
+            </a:fillRef>
+            <a:effectRef idx="0">
+              <a:schemeClr val="accent1"/>
+            </a:effectRef>
+            <a:fontRef idx="minor">
+              <a:schemeClr val="lt1"/>
+            </a:fontRef>
+          </p:style>
+          <p:txBody>
+            <a:bodyPr rtlCol="0" anchor="ctr"/>
+            <a:lstStyle/>
+            <a:p>
+              <a:pPr algn="ctr"/>
+              <a:endParaRPr lang="en-US" dirty="0"/>
+            </a:p>
+          </p:txBody>
+        </p:sp>
+      </p:grpSp>
+      <p:sp>
+        <p:nvSpPr>
+          <p:cNvPr id="4" name="TextBox 3">
+            <a:extLst>
+              <a:ext uri="{FF2B5EF4-FFF2-40B4-BE49-F238E27FC236}">
+                <a16:creationId xmlns:a16="http://schemas.microsoft.com/office/drawing/2014/main" id="{CC48FDB7-3678-4E41-ABB6-C552C34A8246}"/>
+              </a:ext>
+            </a:extLst>
+          </p:cNvPr>
+          <p:cNvSpPr txBox="1"/>
+          <p:nvPr/>
+        </p:nvSpPr>
+        <p:spPr>
+          <a:xfrm>
+            <a:off x="3221933" y="2411933"/>
+            <a:ext cx="2426277" cy="646331"/>
+          </a:xfrm>
+          <a:prstGeom prst="rect">
+            <a:avLst/>
+          </a:prstGeom>
+          <a:noFill/>
+        </p:spPr>
+        <p:txBody>
+          <a:bodyPr wrap="square" rtlCol="0">
+            <a:spAutoFit/>
+          </a:bodyPr>
+          <a:lstStyle/>
+          <a:p>
+            <a:pPr algn="ctr"/>
+            <a:r>
+              <a:rPr lang="en-US" dirty="0">
+                <a:solidFill>
+                  <a:schemeClr val="bg2"/>
+                </a:solidFill>
+              </a:rPr>
+              <a:t>Back-End Services</a:t>
+            </a:r>
+          </a:p>
+          <a:p>
+            <a:pPr algn="ctr"/>
+            <a:r>
+              <a:rPr lang="en-US" dirty="0">
+                <a:solidFill>
+                  <a:schemeClr val="bg2"/>
+                </a:solidFill>
+              </a:rPr>
+              <a:t>(private)</a:t>
+            </a:r>
+          </a:p>
+        </p:txBody>
+      </p:sp>
+      <p:sp>
+        <p:nvSpPr>
+          <p:cNvPr id="109" name="TextBox 108">
+            <a:extLst>
+              <a:ext uri="{FF2B5EF4-FFF2-40B4-BE49-F238E27FC236}">
+                <a16:creationId xmlns:a16="http://schemas.microsoft.com/office/drawing/2014/main" id="{31540C77-8055-41E7-ACD4-F8FCDCE2A206}"/>
+              </a:ext>
+            </a:extLst>
+          </p:cNvPr>
+          <p:cNvSpPr txBox="1"/>
+          <p:nvPr/>
+        </p:nvSpPr>
+        <p:spPr>
+          <a:xfrm>
+            <a:off x="3690150" y="3116916"/>
+            <a:ext cx="1518920" cy="372411"/>
+          </a:xfrm>
+          <a:prstGeom prst="rect">
+            <a:avLst/>
+          </a:prstGeom>
+          <a:solidFill>
+            <a:schemeClr val="accent1">
+              <a:lumMod val="40000"/>
+              <a:lumOff val="60000"/>
+            </a:schemeClr>
+          </a:solidFill>
+        </p:spPr>
+        <p:txBody>
+          <a:bodyPr wrap="square" rtlCol="0">
+            <a:spAutoFit/>
+          </a:bodyPr>
+          <a:lstStyle/>
+          <a:p>
+            <a:pPr algn="ctr"/>
+            <a:r>
+              <a:rPr lang="en-US" sz="1400" dirty="0">
+                <a:solidFill>
+                  <a:schemeClr val="accent1">
+                    <a:lumMod val="50000"/>
+                  </a:schemeClr>
+                </a:solidFill>
+              </a:rPr>
+              <a:t>App Host</a:t>
+            </a:r>
+          </a:p>
+        </p:txBody>
+      </p:sp>
+      <p:sp>
+        <p:nvSpPr>
+          <p:cNvPr id="111" name="TextBox 110">
+            <a:extLst>
+              <a:ext uri="{FF2B5EF4-FFF2-40B4-BE49-F238E27FC236}">
+                <a16:creationId xmlns:a16="http://schemas.microsoft.com/office/drawing/2014/main" id="{8069406A-A8F7-46F4-9B37-A0F6C0FB3D8F}"/>
+              </a:ext>
+            </a:extLst>
+          </p:cNvPr>
+          <p:cNvSpPr txBox="1"/>
+          <p:nvPr/>
+        </p:nvSpPr>
+        <p:spPr>
+          <a:xfrm>
+            <a:off x="3690150" y="3605448"/>
+            <a:ext cx="1518920" cy="372411"/>
+          </a:xfrm>
+          <a:prstGeom prst="rect">
+            <a:avLst/>
+          </a:prstGeom>
+          <a:solidFill>
+            <a:schemeClr val="accent1">
+              <a:lumMod val="40000"/>
+              <a:lumOff val="60000"/>
+            </a:schemeClr>
+          </a:solidFill>
+        </p:spPr>
+        <p:txBody>
+          <a:bodyPr wrap="square" rtlCol="0">
+            <a:spAutoFit/>
+          </a:bodyPr>
+          <a:lstStyle/>
+          <a:p>
+            <a:pPr algn="ctr"/>
+            <a:r>
+              <a:rPr lang="en-US" sz="1400" dirty="0">
+                <a:solidFill>
+                  <a:schemeClr val="accent1">
+                    <a:lumMod val="50000"/>
+                  </a:schemeClr>
+                </a:solidFill>
+              </a:rPr>
+              <a:t>Data Runtime</a:t>
+            </a:r>
+          </a:p>
+        </p:txBody>
+      </p:sp>
+      <p:sp>
+        <p:nvSpPr>
+          <p:cNvPr id="6" name="TextBox 5">
+            <a:extLst>
+              <a:ext uri="{FF2B5EF4-FFF2-40B4-BE49-F238E27FC236}">
+                <a16:creationId xmlns:a16="http://schemas.microsoft.com/office/drawing/2014/main" id="{A009BE90-CBAE-4312-A1B7-3EFEADD5E6E7}"/>
+              </a:ext>
+            </a:extLst>
+          </p:cNvPr>
+          <p:cNvSpPr txBox="1"/>
+          <p:nvPr/>
+        </p:nvSpPr>
+        <p:spPr>
+          <a:xfrm>
+            <a:off x="6094138" y="2411932"/>
+            <a:ext cx="1918985" cy="646331"/>
+          </a:xfrm>
+          <a:prstGeom prst="rect">
+            <a:avLst/>
+          </a:prstGeom>
+          <a:solidFill>
+            <a:schemeClr val="accent1"/>
+          </a:solidFill>
+        </p:spPr>
+        <p:txBody>
+          <a:bodyPr wrap="square" rtlCol="0">
+            <a:spAutoFit/>
+          </a:bodyPr>
+          <a:lstStyle/>
+          <a:p>
+            <a:pPr algn="ctr"/>
+            <a:r>
+              <a:rPr lang="en-US" dirty="0">
+                <a:solidFill>
+                  <a:schemeClr val="bg2"/>
+                </a:solidFill>
+              </a:rPr>
+              <a:t>Power Apps Resource Provider</a:t>
+            </a:r>
+          </a:p>
+        </p:txBody>
+      </p:sp>
+      <p:sp>
+        <p:nvSpPr>
+          <p:cNvPr id="118" name="Arrow: Right 117">
+            <a:extLst>
+              <a:ext uri="{FF2B5EF4-FFF2-40B4-BE49-F238E27FC236}">
+                <a16:creationId xmlns:a16="http://schemas.microsoft.com/office/drawing/2014/main" id="{1D9CE6D2-643B-4AFF-973B-09DC6A574BBF}"/>
+              </a:ext>
+            </a:extLst>
+          </p:cNvPr>
+          <p:cNvSpPr/>
+          <p:nvPr/>
+        </p:nvSpPr>
+        <p:spPr>
+          <a:xfrm flipH="1">
+            <a:off x="5841639" y="3645027"/>
+            <a:ext cx="3595037" cy="412069"/>
+          </a:xfrm>
+          <a:prstGeom prst="rightArrow">
+            <a:avLst/>
+          </a:prstGeom>
+          <a:solidFill>
+            <a:schemeClr val="accent1">
+              <a:lumMod val="40000"/>
+              <a:lumOff val="60000"/>
+            </a:schemeClr>
+          </a:solidFill>
+        </p:spPr>
+        <p:style>
+          <a:lnRef idx="2">
+            <a:schemeClr val="accent1">
+              <a:shade val="50000"/>
+            </a:schemeClr>
+          </a:lnRef>
+          <a:fillRef idx="1">
+            <a:schemeClr val="accent1"/>
+          </a:fillRef>
+          <a:effectRef idx="0">
+            <a:schemeClr val="accent1"/>
+          </a:effectRef>
+          <a:fontRef idx="minor">
+            <a:schemeClr val="lt1"/>
+          </a:fontRef>
+        </p:style>
+        <p:txBody>
+          <a:bodyPr rtlCol="0" anchor="ctr"/>
+          <a:lstStyle/>
+          <a:p>
+            <a:pPr algn="ctr"/>
+            <a:endParaRPr lang="en-US"/>
+          </a:p>
+        </p:txBody>
+      </p:sp>
+      <p:sp>
+        <p:nvSpPr>
+          <p:cNvPr id="120" name="Arrow: Right 119">
+            <a:extLst>
+              <a:ext uri="{FF2B5EF4-FFF2-40B4-BE49-F238E27FC236}">
+                <a16:creationId xmlns:a16="http://schemas.microsoft.com/office/drawing/2014/main" id="{B0D0BB97-B55D-419A-B49E-B6F2DE8B07AD}"/>
+              </a:ext>
+            </a:extLst>
+          </p:cNvPr>
+          <p:cNvSpPr/>
+          <p:nvPr/>
+        </p:nvSpPr>
+        <p:spPr>
+          <a:xfrm>
+            <a:off x="5841640" y="3137500"/>
+            <a:ext cx="3595037" cy="412069"/>
+          </a:xfrm>
+          <a:prstGeom prst="rightArrow">
+            <a:avLst/>
+          </a:prstGeom>
+          <a:solidFill>
+            <a:schemeClr val="accent1">
+              <a:lumMod val="40000"/>
+              <a:lumOff val="60000"/>
+            </a:schemeClr>
+          </a:solidFill>
+        </p:spPr>
+        <p:style>
+          <a:lnRef idx="2">
+            <a:schemeClr val="accent1">
+              <a:shade val="50000"/>
+            </a:schemeClr>
+          </a:lnRef>
+          <a:fillRef idx="1">
+            <a:schemeClr val="accent1"/>
+          </a:fillRef>
+          <a:effectRef idx="0">
+            <a:schemeClr val="accent1"/>
+          </a:effectRef>
+          <a:fontRef idx="minor">
+            <a:schemeClr val="lt1"/>
+          </a:fontRef>
+        </p:style>
+        <p:txBody>
+          <a:bodyPr rtlCol="0" anchor="ctr"/>
+          <a:lstStyle/>
+          <a:p>
+            <a:pPr algn="ctr"/>
+            <a:endParaRPr lang="en-US"/>
+          </a:p>
+        </p:txBody>
+      </p:sp>
+      <p:grpSp>
+        <p:nvGrpSpPr>
+          <p:cNvPr id="17" name="Group 16">
+            <a:extLst>
+              <a:ext uri="{FF2B5EF4-FFF2-40B4-BE49-F238E27FC236}">
+                <a16:creationId xmlns:a16="http://schemas.microsoft.com/office/drawing/2014/main" id="{71EBEC09-59F0-4C98-8D9C-616B9A713196}"/>
+              </a:ext>
+            </a:extLst>
+          </p:cNvPr>
+          <p:cNvGrpSpPr/>
+          <p:nvPr/>
+        </p:nvGrpSpPr>
+        <p:grpSpPr>
+          <a:xfrm>
+            <a:off x="9436677" y="2263486"/>
+            <a:ext cx="2331028" cy="2331028"/>
+            <a:chOff x="9436677" y="2263486"/>
+            <a:chExt cx="2331028" cy="2331028"/>
+          </a:xfrm>
+        </p:grpSpPr>
+        <p:pic>
+          <p:nvPicPr>
+            <p:cNvPr id="15" name="Graphic 14" descr="Cloud with solid fill">
+              <a:extLst>
+                <a:ext uri="{FF2B5EF4-FFF2-40B4-BE49-F238E27FC236}">
+                  <a16:creationId xmlns:a16="http://schemas.microsoft.com/office/drawing/2014/main" id="{AF281CA9-8FF9-46E7-9E96-406AF377AAA6}"/>
+                </a:ext>
+              </a:extLst>
+            </p:cNvPr>
+            <p:cNvPicPr>
+              <a:picLocks noChangeAspect="1"/>
+            </p:cNvPicPr>
+            <p:nvPr/>
+          </p:nvPicPr>
+          <p:blipFill>
+            <a:blip r:embed="rId3">
+              <a:extLst>
+                <a:ext uri="{28A0092B-C50C-407E-A947-70E740481C1C}">
+                  <a14:useLocalDpi xmlns:a14="http://schemas.microsoft.com/office/drawing/2010/main" val="0"/>
+                </a:ext>
+                <a:ext uri="{96DAC541-7B7A-43D3-8B79-37D633B846F1}">
+                  <asvg:svgBlip xmlns:asvg="http://schemas.microsoft.com/office/drawing/2016/SVG/main" r:embed="rId4"/>
+                </a:ext>
+              </a:extLst>
+            </a:blip>
+            <a:stretch>
+              <a:fillRect/>
+            </a:stretch>
+          </p:blipFill>
+          <p:spPr>
+            <a:xfrm>
+              <a:off x="9436677" y="2263486"/>
+              <a:ext cx="2331028" cy="2331028"/>
+            </a:xfrm>
+            <a:prstGeom prst="rect">
+              <a:avLst/>
+            </a:prstGeom>
+          </p:spPr>
+        </p:pic>
+        <p:sp>
+          <p:nvSpPr>
+            <p:cNvPr id="16" name="TextBox 15">
+              <a:extLst>
+                <a:ext uri="{FF2B5EF4-FFF2-40B4-BE49-F238E27FC236}">
+                  <a16:creationId xmlns:a16="http://schemas.microsoft.com/office/drawing/2014/main" id="{79DAE505-94F3-49D3-8CA1-41C1D30677FF}"/>
+                </a:ext>
+              </a:extLst>
+            </p:cNvPr>
+            <p:cNvSpPr txBox="1"/>
+            <p:nvPr/>
+          </p:nvSpPr>
+          <p:spPr>
+            <a:xfrm flipH="1">
+              <a:off x="9989127" y="3371237"/>
+              <a:ext cx="1316530" cy="369332"/>
+            </a:xfrm>
+            <a:prstGeom prst="rect">
+              <a:avLst/>
+            </a:prstGeom>
+            <a:noFill/>
+          </p:spPr>
+          <p:txBody>
+            <a:bodyPr wrap="square" rtlCol="0">
+              <a:spAutoFit/>
+            </a:bodyPr>
+            <a:lstStyle/>
+            <a:p>
+              <a:r>
+                <a:rPr lang="en-US" dirty="0" err="1">
+                  <a:solidFill>
+                    <a:schemeClr val="bg1"/>
+                  </a:solidFill>
+                </a:rPr>
+                <a:t>Dataverse</a:t>
+              </a:r>
+              <a:endParaRPr lang="en-US" dirty="0">
+                <a:solidFill>
+                  <a:schemeClr val="bg1"/>
+                </a:solidFill>
+              </a:endParaRPr>
+            </a:p>
+          </p:txBody>
+        </p:sp>
+      </p:grpSp>
+      <p:sp>
+        <p:nvSpPr>
+          <p:cNvPr id="18" name="TextBox 17">
+            <a:extLst>
+              <a:ext uri="{FF2B5EF4-FFF2-40B4-BE49-F238E27FC236}">
+                <a16:creationId xmlns:a16="http://schemas.microsoft.com/office/drawing/2014/main" id="{D4FED264-FCE1-417C-88C2-E445F52ADA10}"/>
+              </a:ext>
+            </a:extLst>
+          </p:cNvPr>
+          <p:cNvSpPr txBox="1"/>
+          <p:nvPr/>
+        </p:nvSpPr>
+        <p:spPr>
+          <a:xfrm>
+            <a:off x="6556599" y="3181550"/>
+            <a:ext cx="1678132" cy="307777"/>
+          </a:xfrm>
+          <a:prstGeom prst="rect">
+            <a:avLst/>
+          </a:prstGeom>
+          <a:noFill/>
+        </p:spPr>
+        <p:txBody>
+          <a:bodyPr wrap="square" rtlCol="0">
+            <a:spAutoFit/>
+          </a:bodyPr>
+          <a:lstStyle/>
+          <a:p>
+            <a:r>
+              <a:rPr lang="en-US" sz="1400" dirty="0"/>
+              <a:t>1. Request data</a:t>
+            </a:r>
+          </a:p>
+        </p:txBody>
+      </p:sp>
+      <p:sp>
+        <p:nvSpPr>
+          <p:cNvPr id="21" name="TextBox 20">
+            <a:extLst>
+              <a:ext uri="{FF2B5EF4-FFF2-40B4-BE49-F238E27FC236}">
+                <a16:creationId xmlns:a16="http://schemas.microsoft.com/office/drawing/2014/main" id="{1D6C84E2-F235-4349-855B-A2106125436B}"/>
+              </a:ext>
+            </a:extLst>
+          </p:cNvPr>
+          <p:cNvSpPr txBox="1"/>
+          <p:nvPr/>
+        </p:nvSpPr>
+        <p:spPr>
+          <a:xfrm>
+            <a:off x="6571709" y="3697172"/>
+            <a:ext cx="1678132" cy="307777"/>
+          </a:xfrm>
+          <a:prstGeom prst="rect">
+            <a:avLst/>
+          </a:prstGeom>
+          <a:noFill/>
+        </p:spPr>
+        <p:txBody>
+          <a:bodyPr wrap="square" rtlCol="0">
+            <a:spAutoFit/>
+          </a:bodyPr>
+          <a:lstStyle/>
+          <a:p>
+            <a:r>
+              <a:rPr lang="en-US" sz="1400" dirty="0"/>
+              <a:t>2. Query results</a:t>
+            </a:r>
+          </a:p>
+        </p:txBody>
+      </p:sp>
+      <p:sp>
+        <p:nvSpPr>
+          <p:cNvPr id="2" name="TextBox 1">
+            <a:extLst>
+              <a:ext uri="{FF2B5EF4-FFF2-40B4-BE49-F238E27FC236}">
+                <a16:creationId xmlns:a16="http://schemas.microsoft.com/office/drawing/2014/main" id="{53A9024A-E7E2-42A1-A749-7634F3E29877}"/>
+              </a:ext>
+            </a:extLst>
+          </p:cNvPr>
+          <p:cNvSpPr txBox="1"/>
+          <p:nvPr/>
+        </p:nvSpPr>
+        <p:spPr>
+          <a:xfrm>
+            <a:off x="106808" y="524634"/>
+            <a:ext cx="5987330" cy="369332"/>
+          </a:xfrm>
+          <a:prstGeom prst="rect">
+            <a:avLst/>
+          </a:prstGeom>
+          <a:solidFill>
+            <a:schemeClr val="accent1">
+              <a:lumMod val="20000"/>
+              <a:lumOff val="80000"/>
+            </a:schemeClr>
+          </a:solidFill>
+        </p:spPr>
+        <p:txBody>
+          <a:bodyPr wrap="square" rtlCol="0">
+            <a:spAutoFit/>
+          </a:bodyPr>
+          <a:lstStyle/>
+          <a:p>
+            <a:pPr algn="ctr"/>
+            <a:r>
+              <a:rPr lang="en-US" dirty="0">
+                <a:solidFill>
+                  <a:schemeClr val="accent1">
+                    <a:lumMod val="75000"/>
+                  </a:schemeClr>
+                </a:solidFill>
+              </a:rPr>
+              <a:t>Power Platform Back-End Cluster</a:t>
+            </a:r>
+          </a:p>
+        </p:txBody>
+      </p:sp>
+    </p:spTree>
+    <p:extLst>
+      <p:ext uri="{BB962C8B-B14F-4D97-AF65-F5344CB8AC3E}">
+        <p14:creationId xmlns:p14="http://schemas.microsoft.com/office/powerpoint/2010/main" val="981737103"/>
+      </p:ext>
+    </p:extLst>
+  </p:cSld>
+  <p:clrMapOvr>
+    <a:masterClrMapping/>
+  </p:clrMapOvr>
+</p:sld>
+</file>
+
+<file path=ppt/slides/slide5.xml><?xml version="1.0" encoding="utf-8"?>
+<p:sld xmlns:a="http://schemas.openxmlformats.org/drawingml/2006/main" xmlns:r="http://schemas.openxmlformats.org/officeDocument/2006/relationships" xmlns:p="http://schemas.openxmlformats.org/presentationml/2006/main">
+  <p:cSld>
+    <p:bg>
+      <p:bgPr>
+        <a:solidFill>
+          <a:schemeClr val="bg2"/>
+        </a:solidFill>
+        <a:effectLst/>
+      </p:bgPr>
+    </p:bg>
+    <p:spTree>
+      <p:nvGrpSpPr>
+        <p:cNvPr id="1" name=""/>
+        <p:cNvGrpSpPr/>
+        <p:nvPr/>
+      </p:nvGrpSpPr>
+      <p:grpSpPr>
+        <a:xfrm>
+          <a:off x="0" y="0"/>
+          <a:ext cx="0" cy="0"/>
+          <a:chOff x="0" y="0"/>
+          <a:chExt cx="0" cy="0"/>
+        </a:xfrm>
+      </p:grpSpPr>
+      <p:sp>
+        <p:nvSpPr>
+          <p:cNvPr id="80" name="Rectangle 79">
+            <a:extLst>
+              <a:ext uri="{FF2B5EF4-FFF2-40B4-BE49-F238E27FC236}">
+                <a16:creationId xmlns:a16="http://schemas.microsoft.com/office/drawing/2014/main" id="{6DF63860-8733-4CF4-9492-573859B36EBC}"/>
+              </a:ext>
+            </a:extLst>
+          </p:cNvPr>
+          <p:cNvSpPr/>
+          <p:nvPr/>
+        </p:nvSpPr>
+        <p:spPr>
+          <a:xfrm>
+            <a:off x="108671" y="2699424"/>
+            <a:ext cx="5987330" cy="1377083"/>
+          </a:xfrm>
+          <a:prstGeom prst="rect">
+            <a:avLst/>
+          </a:prstGeom>
+          <a:solidFill>
+            <a:srgbClr val="DAE3F3"/>
+          </a:solidFill>
+          <a:ln>
+            <a:noFill/>
+          </a:ln>
+        </p:spPr>
+        <p:style>
+          <a:lnRef idx="2">
+            <a:schemeClr val="accent1">
+              <a:shade val="50000"/>
+            </a:schemeClr>
+          </a:lnRef>
+          <a:fillRef idx="1">
+            <a:schemeClr val="accent1"/>
+          </a:fillRef>
+          <a:effectRef idx="0">
+            <a:schemeClr val="accent1"/>
+          </a:effectRef>
+          <a:fontRef idx="minor">
+            <a:schemeClr val="lt1"/>
+          </a:fontRef>
+        </p:style>
+        <p:txBody>
+          <a:bodyPr rtlCol="0" anchor="ctr"/>
+          <a:lstStyle/>
+          <a:p>
+            <a:pPr algn="ctr"/>
+            <a:endParaRPr lang="en-US" dirty="0"/>
+          </a:p>
+        </p:txBody>
+      </p:sp>
+      <p:pic>
+        <p:nvPicPr>
+          <p:cNvPr id="3" name="Picture 2" descr="Graphical user interface, application, PowerPoint&#10;&#10;Description automatically generated">
+            <a:extLst>
+              <a:ext uri="{FF2B5EF4-FFF2-40B4-BE49-F238E27FC236}">
+                <a16:creationId xmlns:a16="http://schemas.microsoft.com/office/drawing/2014/main" id="{432C91AB-950A-4DB1-9528-CCE48DC8ADDA}"/>
+              </a:ext>
+            </a:extLst>
+          </p:cNvPr>
+          <p:cNvPicPr>
+            <a:picLocks noChangeAspect="1"/>
+          </p:cNvPicPr>
+          <p:nvPr/>
+        </p:nvPicPr>
+        <p:blipFill rotWithShape="1">
+          <a:blip r:embed="rId2">
+            <a:extLst>
+              <a:ext uri="{28A0092B-C50C-407E-A947-70E740481C1C}">
+                <a14:useLocalDpi xmlns:a14="http://schemas.microsoft.com/office/drawing/2010/main" val="0"/>
+              </a:ext>
+            </a:extLst>
+          </a:blip>
+          <a:srcRect l="16348"/>
+          <a:stretch/>
+        </p:blipFill>
+        <p:spPr>
+          <a:xfrm>
+            <a:off x="108670" y="601159"/>
+            <a:ext cx="2969755" cy="2130136"/>
+          </a:xfrm>
+          <a:prstGeom prst="rect">
+            <a:avLst/>
+          </a:prstGeom>
+        </p:spPr>
+      </p:pic>
+      <p:sp>
+        <p:nvSpPr>
+          <p:cNvPr id="10" name="Rectangle 9">
+            <a:extLst>
+              <a:ext uri="{FF2B5EF4-FFF2-40B4-BE49-F238E27FC236}">
+                <a16:creationId xmlns:a16="http://schemas.microsoft.com/office/drawing/2014/main" id="{8F094156-F6E5-4360-B6CB-61C7CF6CDE0B}"/>
+              </a:ext>
+            </a:extLst>
+          </p:cNvPr>
+          <p:cNvSpPr/>
+          <p:nvPr/>
+        </p:nvSpPr>
+        <p:spPr>
+          <a:xfrm>
+            <a:off x="3078425" y="414959"/>
+            <a:ext cx="3027031" cy="2316336"/>
+          </a:xfrm>
+          <a:prstGeom prst="rect">
+            <a:avLst/>
+          </a:prstGeom>
+          <a:solidFill>
+            <a:srgbClr val="DAE3F3"/>
+          </a:solidFill>
+          <a:ln>
+            <a:noFill/>
+          </a:ln>
+        </p:spPr>
+        <p:style>
+          <a:lnRef idx="2">
+            <a:schemeClr val="accent1">
+              <a:shade val="50000"/>
+            </a:schemeClr>
+          </a:lnRef>
+          <a:fillRef idx="1">
+            <a:schemeClr val="accent1"/>
+          </a:fillRef>
+          <a:effectRef idx="0">
+            <a:schemeClr val="accent1"/>
+          </a:effectRef>
+          <a:fontRef idx="minor">
+            <a:schemeClr val="lt1"/>
+          </a:fontRef>
+        </p:style>
+        <p:txBody>
+          <a:bodyPr rtlCol="0" anchor="ctr"/>
+          <a:lstStyle/>
+          <a:p>
+            <a:pPr algn="ctr"/>
+            <a:endParaRPr lang="en-US" dirty="0"/>
+          </a:p>
+        </p:txBody>
+      </p:sp>
+      <p:sp>
+        <p:nvSpPr>
+          <p:cNvPr id="6" name="TextBox 5">
+            <a:extLst>
+              <a:ext uri="{FF2B5EF4-FFF2-40B4-BE49-F238E27FC236}">
+                <a16:creationId xmlns:a16="http://schemas.microsoft.com/office/drawing/2014/main" id="{A009BE90-CBAE-4312-A1B7-3EFEADD5E6E7}"/>
+              </a:ext>
+            </a:extLst>
+          </p:cNvPr>
+          <p:cNvSpPr txBox="1"/>
+          <p:nvPr/>
+        </p:nvSpPr>
+        <p:spPr>
+          <a:xfrm>
+            <a:off x="4661411" y="1886162"/>
+            <a:ext cx="1230952" cy="646331"/>
+          </a:xfrm>
+          <a:prstGeom prst="rect">
+            <a:avLst/>
+          </a:prstGeom>
+          <a:solidFill>
+            <a:schemeClr val="accent1"/>
+          </a:solidFill>
+        </p:spPr>
+        <p:txBody>
+          <a:bodyPr wrap="square" rtlCol="0">
+            <a:spAutoFit/>
+          </a:bodyPr>
+          <a:lstStyle/>
+          <a:p>
+            <a:pPr algn="ctr"/>
+            <a:r>
+              <a:rPr lang="en-US" dirty="0">
+                <a:solidFill>
+                  <a:schemeClr val="bg2"/>
+                </a:solidFill>
+              </a:rPr>
+              <a:t>Power Apps RP</a:t>
+            </a:r>
+          </a:p>
+        </p:txBody>
+      </p:sp>
+      <p:sp>
+        <p:nvSpPr>
+          <p:cNvPr id="118" name="Arrow: Right 117">
+            <a:extLst>
+              <a:ext uri="{FF2B5EF4-FFF2-40B4-BE49-F238E27FC236}">
+                <a16:creationId xmlns:a16="http://schemas.microsoft.com/office/drawing/2014/main" id="{1D9CE6D2-643B-4AFF-973B-09DC6A574BBF}"/>
+              </a:ext>
+            </a:extLst>
+          </p:cNvPr>
+          <p:cNvSpPr/>
+          <p:nvPr/>
+        </p:nvSpPr>
+        <p:spPr>
+          <a:xfrm flipH="1">
+            <a:off x="3146469" y="1440673"/>
+            <a:ext cx="7264851" cy="412069"/>
+          </a:xfrm>
+          <a:prstGeom prst="rightArrow">
+            <a:avLst/>
+          </a:prstGeom>
+          <a:solidFill>
+            <a:schemeClr val="accent1">
+              <a:lumMod val="40000"/>
+              <a:lumOff val="60000"/>
+            </a:schemeClr>
+          </a:solidFill>
+        </p:spPr>
+        <p:style>
+          <a:lnRef idx="2">
+            <a:schemeClr val="accent1">
+              <a:shade val="50000"/>
+            </a:schemeClr>
+          </a:lnRef>
+          <a:fillRef idx="1">
+            <a:schemeClr val="accent1"/>
+          </a:fillRef>
+          <a:effectRef idx="0">
+            <a:schemeClr val="accent1"/>
+          </a:effectRef>
+          <a:fontRef idx="minor">
+            <a:schemeClr val="lt1"/>
+          </a:fontRef>
+        </p:style>
+        <p:txBody>
+          <a:bodyPr rtlCol="0" anchor="ctr"/>
+          <a:lstStyle/>
+          <a:p>
+            <a:pPr algn="ctr"/>
+            <a:endParaRPr lang="en-US"/>
+          </a:p>
+        </p:txBody>
+      </p:sp>
+      <p:pic>
+        <p:nvPicPr>
+          <p:cNvPr id="15" name="Graphic 14" descr="Cloud with solid fill">
+            <a:extLst>
+              <a:ext uri="{FF2B5EF4-FFF2-40B4-BE49-F238E27FC236}">
+                <a16:creationId xmlns:a16="http://schemas.microsoft.com/office/drawing/2014/main" id="{AF281CA9-8FF9-46E7-9E96-406AF377AAA6}"/>
+              </a:ext>
+            </a:extLst>
+          </p:cNvPr>
+          <p:cNvPicPr>
+            <a:picLocks noChangeAspect="1"/>
+          </p:cNvPicPr>
+          <p:nvPr/>
+        </p:nvPicPr>
+        <p:blipFill>
+          <a:blip r:embed="rId3">
+            <a:extLst>
+              <a:ext uri="{28A0092B-C50C-407E-A947-70E740481C1C}">
+                <a14:useLocalDpi xmlns:a14="http://schemas.microsoft.com/office/drawing/2010/main" val="0"/>
+              </a:ext>
+              <a:ext uri="{96DAC541-7B7A-43D3-8B79-37D633B846F1}">
+                <asvg:svgBlip xmlns:asvg="http://schemas.microsoft.com/office/drawing/2016/SVG/main" r:embed="rId4"/>
+              </a:ext>
+            </a:extLst>
+          </a:blip>
+          <a:stretch>
+            <a:fillRect/>
+          </a:stretch>
+        </p:blipFill>
+        <p:spPr>
+          <a:xfrm>
+            <a:off x="9817124" y="5157738"/>
+            <a:ext cx="1222786" cy="1228720"/>
+          </a:xfrm>
+          <a:prstGeom prst="rect">
+            <a:avLst/>
+          </a:prstGeom>
+        </p:spPr>
+      </p:pic>
+      <p:sp>
+        <p:nvSpPr>
+          <p:cNvPr id="16" name="TextBox 15">
+            <a:extLst>
+              <a:ext uri="{FF2B5EF4-FFF2-40B4-BE49-F238E27FC236}">
+                <a16:creationId xmlns:a16="http://schemas.microsoft.com/office/drawing/2014/main" id="{79DAE505-94F3-49D3-8CA1-41C1D30677FF}"/>
+              </a:ext>
+            </a:extLst>
+          </p:cNvPr>
+          <p:cNvSpPr txBox="1"/>
+          <p:nvPr/>
+        </p:nvSpPr>
+        <p:spPr>
+          <a:xfrm flipH="1">
+            <a:off x="10146726" y="5694648"/>
+            <a:ext cx="1047551" cy="307777"/>
+          </a:xfrm>
+          <a:prstGeom prst="rect">
+            <a:avLst/>
+          </a:prstGeom>
+          <a:noFill/>
+        </p:spPr>
+        <p:txBody>
+          <a:bodyPr wrap="square" rtlCol="0">
+            <a:spAutoFit/>
+          </a:bodyPr>
+          <a:lstStyle/>
+          <a:p>
+            <a:r>
+              <a:rPr lang="en-US" sz="1400" dirty="0">
+                <a:solidFill>
+                  <a:schemeClr val="bg1"/>
+                </a:solidFill>
+              </a:rPr>
+              <a:t>Excel</a:t>
+            </a:r>
+          </a:p>
+        </p:txBody>
+      </p:sp>
+      <p:sp>
+        <p:nvSpPr>
+          <p:cNvPr id="21" name="TextBox 20">
+            <a:extLst>
+              <a:ext uri="{FF2B5EF4-FFF2-40B4-BE49-F238E27FC236}">
+                <a16:creationId xmlns:a16="http://schemas.microsoft.com/office/drawing/2014/main" id="{1D6C84E2-F235-4349-855B-A2106125436B}"/>
+              </a:ext>
+            </a:extLst>
+          </p:cNvPr>
+          <p:cNvSpPr txBox="1"/>
+          <p:nvPr/>
+        </p:nvSpPr>
+        <p:spPr>
+          <a:xfrm>
+            <a:off x="6174874" y="1496719"/>
+            <a:ext cx="1678132" cy="307777"/>
+          </a:xfrm>
+          <a:prstGeom prst="rect">
+            <a:avLst/>
+          </a:prstGeom>
+          <a:noFill/>
+        </p:spPr>
+        <p:txBody>
+          <a:bodyPr wrap="square" rtlCol="0">
+            <a:spAutoFit/>
+          </a:bodyPr>
+          <a:lstStyle/>
+          <a:p>
+            <a:r>
+              <a:rPr lang="en-US" sz="1400" dirty="0"/>
+              <a:t>10. Query results</a:t>
+            </a:r>
+          </a:p>
+        </p:txBody>
+      </p:sp>
+      <p:pic>
+        <p:nvPicPr>
+          <p:cNvPr id="2" name="Graphic 1" descr="Cloud with solid fill">
+            <a:extLst>
+              <a:ext uri="{FF2B5EF4-FFF2-40B4-BE49-F238E27FC236}">
+                <a16:creationId xmlns:a16="http://schemas.microsoft.com/office/drawing/2014/main" id="{45F47F91-7C5A-4DA9-97CE-D135ECD33E41}"/>
+              </a:ext>
+            </a:extLst>
+          </p:cNvPr>
+          <p:cNvPicPr>
+            <a:picLocks noChangeAspect="1"/>
+          </p:cNvPicPr>
+          <p:nvPr/>
+        </p:nvPicPr>
+        <p:blipFill>
+          <a:blip r:embed="rId3">
+            <a:extLst>
+              <a:ext uri="{28A0092B-C50C-407E-A947-70E740481C1C}">
+                <a14:useLocalDpi xmlns:a14="http://schemas.microsoft.com/office/drawing/2010/main" val="0"/>
+              </a:ext>
+              <a:ext uri="{96DAC541-7B7A-43D3-8B79-37D633B846F1}">
+                <asvg:svgBlip xmlns:asvg="http://schemas.microsoft.com/office/drawing/2016/SVG/main" r:embed="rId4"/>
+              </a:ext>
+            </a:extLst>
+          </a:blip>
+          <a:stretch>
+            <a:fillRect/>
+          </a:stretch>
+        </p:blipFill>
+        <p:spPr>
+          <a:xfrm>
+            <a:off x="10764166" y="5410745"/>
+            <a:ext cx="1222786" cy="1228720"/>
+          </a:xfrm>
+          <a:prstGeom prst="rect">
+            <a:avLst/>
+          </a:prstGeom>
+        </p:spPr>
+      </p:pic>
+      <p:sp>
+        <p:nvSpPr>
+          <p:cNvPr id="5" name="TextBox 4">
+            <a:extLst>
+              <a:ext uri="{FF2B5EF4-FFF2-40B4-BE49-F238E27FC236}">
+                <a16:creationId xmlns:a16="http://schemas.microsoft.com/office/drawing/2014/main" id="{8FCD5F36-D4F4-44EF-94B3-08B486DECE97}"/>
+              </a:ext>
+            </a:extLst>
+          </p:cNvPr>
+          <p:cNvSpPr txBox="1"/>
+          <p:nvPr/>
+        </p:nvSpPr>
+        <p:spPr>
+          <a:xfrm flipH="1">
+            <a:off x="10877056" y="5975040"/>
+            <a:ext cx="1047551" cy="307777"/>
+          </a:xfrm>
+          <a:prstGeom prst="rect">
+            <a:avLst/>
+          </a:prstGeom>
+          <a:noFill/>
+        </p:spPr>
+        <p:txBody>
+          <a:bodyPr wrap="square" rtlCol="0">
+            <a:spAutoFit/>
+          </a:bodyPr>
+          <a:lstStyle/>
+          <a:p>
+            <a:r>
+              <a:rPr lang="en-US" sz="1400" dirty="0">
+                <a:solidFill>
+                  <a:schemeClr val="bg1"/>
+                </a:solidFill>
+              </a:rPr>
+              <a:t>SharePoint</a:t>
+            </a:r>
+          </a:p>
+        </p:txBody>
+      </p:sp>
+      <p:pic>
+        <p:nvPicPr>
+          <p:cNvPr id="7" name="Graphic 6" descr="Cloud with solid fill">
+            <a:extLst>
+              <a:ext uri="{FF2B5EF4-FFF2-40B4-BE49-F238E27FC236}">
+                <a16:creationId xmlns:a16="http://schemas.microsoft.com/office/drawing/2014/main" id="{043EDE61-03E6-47EC-A4E7-19E1FB59A2DC}"/>
+              </a:ext>
+            </a:extLst>
+          </p:cNvPr>
+          <p:cNvPicPr>
+            <a:picLocks noChangeAspect="1"/>
+          </p:cNvPicPr>
+          <p:nvPr/>
+        </p:nvPicPr>
+        <p:blipFill>
+          <a:blip r:embed="rId3">
+            <a:extLst>
+              <a:ext uri="{28A0092B-C50C-407E-A947-70E740481C1C}">
+                <a14:useLocalDpi xmlns:a14="http://schemas.microsoft.com/office/drawing/2010/main" val="0"/>
+              </a:ext>
+              <a:ext uri="{96DAC541-7B7A-43D3-8B79-37D633B846F1}">
+                <asvg:svgBlip xmlns:asvg="http://schemas.microsoft.com/office/drawing/2016/SVG/main" r:embed="rId4"/>
+              </a:ext>
+            </a:extLst>
+          </a:blip>
+          <a:stretch>
+            <a:fillRect/>
+          </a:stretch>
+        </p:blipFill>
+        <p:spPr>
+          <a:xfrm>
+            <a:off x="10789439" y="4796385"/>
+            <a:ext cx="1222786" cy="1228720"/>
+          </a:xfrm>
+          <a:prstGeom prst="rect">
+            <a:avLst/>
+          </a:prstGeom>
+        </p:spPr>
+      </p:pic>
+      <p:sp>
+        <p:nvSpPr>
+          <p:cNvPr id="8" name="TextBox 7">
+            <a:extLst>
+              <a:ext uri="{FF2B5EF4-FFF2-40B4-BE49-F238E27FC236}">
+                <a16:creationId xmlns:a16="http://schemas.microsoft.com/office/drawing/2014/main" id="{AC34AD5A-1922-454F-9F83-42161F9EC1B5}"/>
+              </a:ext>
+            </a:extLst>
+          </p:cNvPr>
+          <p:cNvSpPr txBox="1"/>
+          <p:nvPr/>
+        </p:nvSpPr>
+        <p:spPr>
+          <a:xfrm flipH="1">
+            <a:off x="11144449" y="5311790"/>
+            <a:ext cx="1047551" cy="307777"/>
+          </a:xfrm>
+          <a:prstGeom prst="rect">
+            <a:avLst/>
+          </a:prstGeom>
+          <a:noFill/>
+        </p:spPr>
+        <p:txBody>
+          <a:bodyPr wrap="square" rtlCol="0">
+            <a:spAutoFit/>
+          </a:bodyPr>
+          <a:lstStyle/>
+          <a:p>
+            <a:r>
+              <a:rPr lang="en-US" sz="1400" dirty="0">
+                <a:solidFill>
+                  <a:schemeClr val="bg1"/>
+                </a:solidFill>
+              </a:rPr>
+              <a:t>SQL</a:t>
+            </a:r>
+          </a:p>
+        </p:txBody>
+      </p:sp>
+      <p:sp>
+        <p:nvSpPr>
+          <p:cNvPr id="11" name="Arrow: Right 10">
+            <a:extLst>
+              <a:ext uri="{FF2B5EF4-FFF2-40B4-BE49-F238E27FC236}">
+                <a16:creationId xmlns:a16="http://schemas.microsoft.com/office/drawing/2014/main" id="{75A18C58-E3A5-4A2E-AA6C-DAE474D492C7}"/>
+              </a:ext>
+            </a:extLst>
+          </p:cNvPr>
+          <p:cNvSpPr/>
+          <p:nvPr/>
+        </p:nvSpPr>
+        <p:spPr>
+          <a:xfrm>
+            <a:off x="3128630" y="1989581"/>
+            <a:ext cx="1532782" cy="412069"/>
+          </a:xfrm>
+          <a:prstGeom prst="rightArrow">
+            <a:avLst/>
+          </a:prstGeom>
+          <a:solidFill>
+            <a:schemeClr val="accent1">
+              <a:lumMod val="40000"/>
+              <a:lumOff val="60000"/>
+            </a:schemeClr>
+          </a:solidFill>
+        </p:spPr>
+        <p:style>
+          <a:lnRef idx="2">
+            <a:schemeClr val="accent1">
+              <a:shade val="50000"/>
+            </a:schemeClr>
+          </a:lnRef>
+          <a:fillRef idx="1">
+            <a:schemeClr val="accent1"/>
+          </a:fillRef>
+          <a:effectRef idx="0">
+            <a:schemeClr val="accent1"/>
+          </a:effectRef>
+          <a:fontRef idx="minor">
+            <a:schemeClr val="lt1"/>
+          </a:fontRef>
+        </p:style>
+        <p:txBody>
+          <a:bodyPr rtlCol="0" anchor="ctr"/>
+          <a:lstStyle/>
+          <a:p>
+            <a:pPr algn="ctr"/>
+            <a:endParaRPr lang="en-US"/>
+          </a:p>
+        </p:txBody>
+      </p:sp>
+      <p:sp>
+        <p:nvSpPr>
+          <p:cNvPr id="13" name="TextBox 12">
+            <a:extLst>
+              <a:ext uri="{FF2B5EF4-FFF2-40B4-BE49-F238E27FC236}">
+                <a16:creationId xmlns:a16="http://schemas.microsoft.com/office/drawing/2014/main" id="{88A89430-F10B-4218-AD17-690FF2B57BDC}"/>
+              </a:ext>
+            </a:extLst>
+          </p:cNvPr>
+          <p:cNvSpPr txBox="1"/>
+          <p:nvPr/>
+        </p:nvSpPr>
+        <p:spPr>
+          <a:xfrm>
+            <a:off x="3351083" y="1816016"/>
+            <a:ext cx="2256769" cy="523220"/>
+          </a:xfrm>
+          <a:prstGeom prst="rect">
+            <a:avLst/>
+          </a:prstGeom>
+          <a:noFill/>
+        </p:spPr>
+        <p:txBody>
+          <a:bodyPr wrap="square" rtlCol="0">
+            <a:spAutoFit/>
+          </a:bodyPr>
+          <a:lstStyle/>
+          <a:p>
+            <a:r>
+              <a:rPr lang="en-US" sz="1400" dirty="0"/>
+              <a:t>1. Request </a:t>
+            </a:r>
+            <a:br>
+              <a:rPr lang="en-US" sz="1400" dirty="0"/>
+            </a:br>
+            <a:r>
+              <a:rPr lang="en-US" sz="1400" dirty="0"/>
+              <a:t>connection</a:t>
+            </a:r>
+          </a:p>
+        </p:txBody>
+      </p:sp>
+      <p:sp>
+        <p:nvSpPr>
+          <p:cNvPr id="14" name="TextBox 13">
+            <a:extLst>
+              <a:ext uri="{FF2B5EF4-FFF2-40B4-BE49-F238E27FC236}">
+                <a16:creationId xmlns:a16="http://schemas.microsoft.com/office/drawing/2014/main" id="{216AFE1D-2E62-4A9E-B5D1-922DF4D6CF7E}"/>
+              </a:ext>
+            </a:extLst>
+          </p:cNvPr>
+          <p:cNvSpPr txBox="1"/>
+          <p:nvPr/>
+        </p:nvSpPr>
+        <p:spPr>
+          <a:xfrm>
+            <a:off x="7580429" y="1804496"/>
+            <a:ext cx="891396" cy="1477328"/>
+          </a:xfrm>
+          <a:prstGeom prst="rect">
+            <a:avLst/>
+          </a:prstGeom>
+          <a:solidFill>
+            <a:schemeClr val="accent1"/>
+          </a:solidFill>
+        </p:spPr>
+        <p:txBody>
+          <a:bodyPr wrap="square" rtlCol="0">
+            <a:spAutoFit/>
+          </a:bodyPr>
+          <a:lstStyle/>
+          <a:p>
+            <a:pPr algn="ctr"/>
+            <a:r>
+              <a:rPr lang="en-US" dirty="0">
+                <a:solidFill>
+                  <a:schemeClr val="bg2"/>
+                </a:solidFill>
+              </a:rPr>
+              <a:t>API Hub/</a:t>
+            </a:r>
+          </a:p>
+          <a:p>
+            <a:pPr algn="ctr"/>
+            <a:r>
+              <a:rPr lang="en-US" dirty="0">
+                <a:solidFill>
+                  <a:schemeClr val="bg2"/>
+                </a:solidFill>
+              </a:rPr>
+              <a:t>APIM</a:t>
+            </a:r>
+          </a:p>
+          <a:p>
+            <a:pPr algn="ctr"/>
+            <a:endParaRPr lang="en-US" dirty="0">
+              <a:solidFill>
+                <a:schemeClr val="bg2"/>
+              </a:solidFill>
+            </a:endParaRPr>
+          </a:p>
+          <a:p>
+            <a:pPr algn="ctr"/>
+            <a:endParaRPr lang="en-US" dirty="0">
+              <a:solidFill>
+                <a:schemeClr val="bg2"/>
+              </a:solidFill>
+            </a:endParaRPr>
+          </a:p>
+        </p:txBody>
+      </p:sp>
+      <p:sp>
+        <p:nvSpPr>
+          <p:cNvPr id="24" name="TextBox 23">
+            <a:extLst>
+              <a:ext uri="{FF2B5EF4-FFF2-40B4-BE49-F238E27FC236}">
+                <a16:creationId xmlns:a16="http://schemas.microsoft.com/office/drawing/2014/main" id="{F00BF5D7-A3F9-4708-AF9C-619D53469608}"/>
+              </a:ext>
+            </a:extLst>
+          </p:cNvPr>
+          <p:cNvSpPr txBox="1"/>
+          <p:nvPr/>
+        </p:nvSpPr>
+        <p:spPr>
+          <a:xfrm>
+            <a:off x="7473654" y="4276765"/>
+            <a:ext cx="1230952" cy="646331"/>
+          </a:xfrm>
+          <a:prstGeom prst="rect">
+            <a:avLst/>
+          </a:prstGeom>
+          <a:solidFill>
+            <a:schemeClr val="accent1"/>
+          </a:solidFill>
+        </p:spPr>
+        <p:txBody>
+          <a:bodyPr wrap="square" rtlCol="0">
+            <a:spAutoFit/>
+          </a:bodyPr>
+          <a:lstStyle/>
+          <a:p>
+            <a:pPr algn="ctr"/>
+            <a:r>
+              <a:rPr lang="en-US" dirty="0">
+                <a:solidFill>
+                  <a:schemeClr val="bg2"/>
+                </a:solidFill>
+              </a:rPr>
+              <a:t>Consent Service</a:t>
+            </a:r>
+          </a:p>
+        </p:txBody>
+      </p:sp>
+      <p:sp>
+        <p:nvSpPr>
+          <p:cNvPr id="26" name="TextBox 25">
+            <a:extLst>
+              <a:ext uri="{FF2B5EF4-FFF2-40B4-BE49-F238E27FC236}">
+                <a16:creationId xmlns:a16="http://schemas.microsoft.com/office/drawing/2014/main" id="{FCE3B3C1-0410-450C-9F16-62FC82033694}"/>
+              </a:ext>
+            </a:extLst>
+          </p:cNvPr>
+          <p:cNvSpPr txBox="1"/>
+          <p:nvPr/>
+        </p:nvSpPr>
+        <p:spPr>
+          <a:xfrm>
+            <a:off x="10437152" y="1532851"/>
+            <a:ext cx="1187789" cy="1477328"/>
+          </a:xfrm>
+          <a:prstGeom prst="rect">
+            <a:avLst/>
+          </a:prstGeom>
+          <a:solidFill>
+            <a:schemeClr val="accent1"/>
+          </a:solidFill>
+        </p:spPr>
+        <p:txBody>
+          <a:bodyPr wrap="square" rtlCol="0">
+            <a:spAutoFit/>
+          </a:bodyPr>
+          <a:lstStyle/>
+          <a:p>
+            <a:pPr algn="ctr"/>
+            <a:r>
+              <a:rPr lang="en-US" dirty="0">
+                <a:solidFill>
+                  <a:schemeClr val="bg2"/>
+                </a:solidFill>
+              </a:rPr>
+              <a:t>Connector</a:t>
+            </a:r>
+          </a:p>
+          <a:p>
+            <a:pPr algn="ctr"/>
+            <a:endParaRPr lang="en-US" dirty="0">
+              <a:solidFill>
+                <a:schemeClr val="bg2"/>
+              </a:solidFill>
+            </a:endParaRPr>
+          </a:p>
+          <a:p>
+            <a:pPr algn="ctr"/>
+            <a:endParaRPr lang="en-US" dirty="0">
+              <a:solidFill>
+                <a:schemeClr val="bg2"/>
+              </a:solidFill>
+            </a:endParaRPr>
+          </a:p>
+          <a:p>
+            <a:pPr algn="ctr"/>
+            <a:endParaRPr lang="en-US" dirty="0">
+              <a:solidFill>
+                <a:schemeClr val="bg2"/>
+              </a:solidFill>
+            </a:endParaRPr>
+          </a:p>
+          <a:p>
+            <a:pPr algn="ctr"/>
+            <a:endParaRPr lang="en-US" dirty="0">
+              <a:solidFill>
+                <a:schemeClr val="bg2"/>
+              </a:solidFill>
+            </a:endParaRPr>
+          </a:p>
+        </p:txBody>
+      </p:sp>
+      <p:sp>
+        <p:nvSpPr>
+          <p:cNvPr id="32" name="Arrow: Right 31">
+            <a:extLst>
+              <a:ext uri="{FF2B5EF4-FFF2-40B4-BE49-F238E27FC236}">
+                <a16:creationId xmlns:a16="http://schemas.microsoft.com/office/drawing/2014/main" id="{DEDACD4D-B6D7-47FA-B545-18E2B4F24609}"/>
+              </a:ext>
+            </a:extLst>
+          </p:cNvPr>
+          <p:cNvSpPr/>
+          <p:nvPr/>
+        </p:nvSpPr>
+        <p:spPr>
+          <a:xfrm>
+            <a:off x="3156024" y="2956806"/>
+            <a:ext cx="4414950" cy="412069"/>
+          </a:xfrm>
+          <a:prstGeom prst="rightArrow">
+            <a:avLst/>
+          </a:prstGeom>
+          <a:solidFill>
+            <a:schemeClr val="accent1">
+              <a:lumMod val="40000"/>
+              <a:lumOff val="60000"/>
+            </a:schemeClr>
+          </a:solidFill>
+        </p:spPr>
+        <p:style>
+          <a:lnRef idx="2">
+            <a:schemeClr val="accent1">
+              <a:shade val="50000"/>
+            </a:schemeClr>
+          </a:lnRef>
+          <a:fillRef idx="1">
+            <a:schemeClr val="accent1"/>
+          </a:fillRef>
+          <a:effectRef idx="0">
+            <a:schemeClr val="accent1"/>
+          </a:effectRef>
+          <a:fontRef idx="minor">
+            <a:schemeClr val="lt1"/>
+          </a:fontRef>
+        </p:style>
+        <p:txBody>
+          <a:bodyPr rtlCol="0" anchor="ctr"/>
+          <a:lstStyle/>
+          <a:p>
+            <a:pPr algn="ctr"/>
+            <a:endParaRPr lang="en-US"/>
+          </a:p>
+        </p:txBody>
+      </p:sp>
+      <p:sp>
+        <p:nvSpPr>
+          <p:cNvPr id="34" name="TextBox 33">
+            <a:extLst>
+              <a:ext uri="{FF2B5EF4-FFF2-40B4-BE49-F238E27FC236}">
+                <a16:creationId xmlns:a16="http://schemas.microsoft.com/office/drawing/2014/main" id="{F40EB1C3-F5BB-4C11-AA3C-71721C26F6F5}"/>
+              </a:ext>
+            </a:extLst>
+          </p:cNvPr>
+          <p:cNvSpPr txBox="1"/>
+          <p:nvPr/>
+        </p:nvSpPr>
+        <p:spPr>
+          <a:xfrm>
+            <a:off x="4796436" y="3010179"/>
+            <a:ext cx="2256769" cy="307777"/>
+          </a:xfrm>
+          <a:prstGeom prst="rect">
+            <a:avLst/>
+          </a:prstGeom>
+          <a:noFill/>
+        </p:spPr>
+        <p:txBody>
+          <a:bodyPr wrap="square" rtlCol="0">
+            <a:spAutoFit/>
+          </a:bodyPr>
+          <a:lstStyle/>
+          <a:p>
+            <a:r>
+              <a:rPr lang="en-US" sz="1400" dirty="0"/>
+              <a:t>3. Request data</a:t>
+            </a:r>
+          </a:p>
+        </p:txBody>
+      </p:sp>
+      <p:sp>
+        <p:nvSpPr>
+          <p:cNvPr id="42" name="Arrow: Right 41">
+            <a:extLst>
+              <a:ext uri="{FF2B5EF4-FFF2-40B4-BE49-F238E27FC236}">
+                <a16:creationId xmlns:a16="http://schemas.microsoft.com/office/drawing/2014/main" id="{26E0123C-FBAC-469B-97BF-91F5BC433B3C}"/>
+              </a:ext>
+            </a:extLst>
+          </p:cNvPr>
+          <p:cNvSpPr/>
+          <p:nvPr/>
+        </p:nvSpPr>
+        <p:spPr>
+          <a:xfrm>
+            <a:off x="5961699" y="1797726"/>
+            <a:ext cx="1594154" cy="412069"/>
+          </a:xfrm>
+          <a:prstGeom prst="rightArrow">
+            <a:avLst/>
+          </a:prstGeom>
+          <a:solidFill>
+            <a:schemeClr val="accent1">
+              <a:lumMod val="40000"/>
+              <a:lumOff val="60000"/>
+            </a:schemeClr>
+          </a:solidFill>
+        </p:spPr>
+        <p:style>
+          <a:lnRef idx="2">
+            <a:schemeClr val="accent1">
+              <a:shade val="50000"/>
+            </a:schemeClr>
+          </a:lnRef>
+          <a:fillRef idx="1">
+            <a:schemeClr val="accent1"/>
+          </a:fillRef>
+          <a:effectRef idx="0">
+            <a:schemeClr val="accent1"/>
+          </a:effectRef>
+          <a:fontRef idx="minor">
+            <a:schemeClr val="lt1"/>
+          </a:fontRef>
+        </p:style>
+        <p:txBody>
+          <a:bodyPr rtlCol="0" anchor="ctr"/>
+          <a:lstStyle/>
+          <a:p>
+            <a:pPr algn="ctr"/>
+            <a:endParaRPr lang="en-US"/>
+          </a:p>
+        </p:txBody>
+      </p:sp>
+      <p:sp>
+        <p:nvSpPr>
+          <p:cNvPr id="44" name="TextBox 43">
+            <a:extLst>
+              <a:ext uri="{FF2B5EF4-FFF2-40B4-BE49-F238E27FC236}">
+                <a16:creationId xmlns:a16="http://schemas.microsoft.com/office/drawing/2014/main" id="{49033EAB-2915-4D6D-975A-9A52F5F205BE}"/>
+              </a:ext>
+            </a:extLst>
+          </p:cNvPr>
+          <p:cNvSpPr txBox="1"/>
+          <p:nvPr/>
+        </p:nvSpPr>
+        <p:spPr>
+          <a:xfrm>
+            <a:off x="5871297" y="1856580"/>
+            <a:ext cx="2256769" cy="307777"/>
+          </a:xfrm>
+          <a:prstGeom prst="rect">
+            <a:avLst/>
+          </a:prstGeom>
+          <a:noFill/>
+        </p:spPr>
+        <p:txBody>
+          <a:bodyPr wrap="square" rtlCol="0">
+            <a:spAutoFit/>
+          </a:bodyPr>
+          <a:lstStyle/>
+          <a:p>
+            <a:r>
+              <a:rPr lang="en-US" sz="1400" dirty="0"/>
+              <a:t>2. Create connection</a:t>
+            </a:r>
+          </a:p>
+        </p:txBody>
+      </p:sp>
+      <p:sp>
+        <p:nvSpPr>
+          <p:cNvPr id="46" name="Arrow: Right 45">
+            <a:extLst>
+              <a:ext uri="{FF2B5EF4-FFF2-40B4-BE49-F238E27FC236}">
+                <a16:creationId xmlns:a16="http://schemas.microsoft.com/office/drawing/2014/main" id="{6BE21DD0-693B-4692-942B-69127CD2D847}"/>
+              </a:ext>
+            </a:extLst>
+          </p:cNvPr>
+          <p:cNvSpPr/>
+          <p:nvPr/>
+        </p:nvSpPr>
+        <p:spPr>
+          <a:xfrm flipH="1">
+            <a:off x="5924821" y="2215933"/>
+            <a:ext cx="1594154" cy="412069"/>
+          </a:xfrm>
+          <a:prstGeom prst="rightArrow">
+            <a:avLst/>
+          </a:prstGeom>
+          <a:solidFill>
+            <a:schemeClr val="accent1">
+              <a:lumMod val="40000"/>
+              <a:lumOff val="60000"/>
+            </a:schemeClr>
+          </a:solidFill>
+        </p:spPr>
+        <p:style>
+          <a:lnRef idx="2">
+            <a:schemeClr val="accent1">
+              <a:shade val="50000"/>
+            </a:schemeClr>
+          </a:lnRef>
+          <a:fillRef idx="1">
+            <a:schemeClr val="accent1"/>
+          </a:fillRef>
+          <a:effectRef idx="0">
+            <a:schemeClr val="accent1"/>
+          </a:effectRef>
+          <a:fontRef idx="minor">
+            <a:schemeClr val="lt1"/>
+          </a:fontRef>
+        </p:style>
+        <p:txBody>
+          <a:bodyPr rtlCol="0" anchor="ctr"/>
+          <a:lstStyle/>
+          <a:p>
+            <a:pPr algn="ctr"/>
+            <a:endParaRPr lang="en-US"/>
+          </a:p>
+        </p:txBody>
+      </p:sp>
+      <p:sp>
+        <p:nvSpPr>
+          <p:cNvPr id="48" name="TextBox 47">
+            <a:extLst>
+              <a:ext uri="{FF2B5EF4-FFF2-40B4-BE49-F238E27FC236}">
+                <a16:creationId xmlns:a16="http://schemas.microsoft.com/office/drawing/2014/main" id="{E3A25684-566D-4ED9-BA0B-D317B327ACF6}"/>
+              </a:ext>
+            </a:extLst>
+          </p:cNvPr>
+          <p:cNvSpPr txBox="1"/>
+          <p:nvPr/>
+        </p:nvSpPr>
+        <p:spPr>
+          <a:xfrm>
+            <a:off x="6254327" y="2274698"/>
+            <a:ext cx="2256769" cy="307777"/>
+          </a:xfrm>
+          <a:prstGeom prst="rect">
+            <a:avLst/>
+          </a:prstGeom>
+          <a:noFill/>
+        </p:spPr>
+        <p:txBody>
+          <a:bodyPr wrap="square" rtlCol="0">
+            <a:spAutoFit/>
+          </a:bodyPr>
+          <a:lstStyle/>
+          <a:p>
+            <a:r>
+              <a:rPr lang="en-US" sz="1400" dirty="0"/>
+              <a:t>6. Consent</a:t>
+            </a:r>
+          </a:p>
+        </p:txBody>
+      </p:sp>
+      <p:sp>
+        <p:nvSpPr>
+          <p:cNvPr id="50" name="Arrow: Right 49">
+            <a:extLst>
+              <a:ext uri="{FF2B5EF4-FFF2-40B4-BE49-F238E27FC236}">
+                <a16:creationId xmlns:a16="http://schemas.microsoft.com/office/drawing/2014/main" id="{57ACAC85-103D-4954-8188-E6081FF53E85}"/>
+              </a:ext>
+            </a:extLst>
+          </p:cNvPr>
+          <p:cNvSpPr/>
+          <p:nvPr/>
+        </p:nvSpPr>
+        <p:spPr>
+          <a:xfrm>
+            <a:off x="8499278" y="2523950"/>
+            <a:ext cx="1912042" cy="412069"/>
+          </a:xfrm>
+          <a:prstGeom prst="rightArrow">
+            <a:avLst/>
+          </a:prstGeom>
+          <a:solidFill>
+            <a:schemeClr val="accent1">
+              <a:lumMod val="40000"/>
+              <a:lumOff val="60000"/>
+            </a:schemeClr>
+          </a:solidFill>
+        </p:spPr>
+        <p:style>
+          <a:lnRef idx="2">
+            <a:schemeClr val="accent1">
+              <a:shade val="50000"/>
+            </a:schemeClr>
+          </a:lnRef>
+          <a:fillRef idx="1">
+            <a:schemeClr val="accent1"/>
+          </a:fillRef>
+          <a:effectRef idx="0">
+            <a:schemeClr val="accent1"/>
+          </a:effectRef>
+          <a:fontRef idx="minor">
+            <a:schemeClr val="lt1"/>
+          </a:fontRef>
+        </p:style>
+        <p:txBody>
+          <a:bodyPr rtlCol="0" anchor="ctr"/>
+          <a:lstStyle/>
+          <a:p>
+            <a:pPr algn="ctr"/>
+            <a:endParaRPr lang="en-US"/>
+          </a:p>
+        </p:txBody>
+      </p:sp>
+      <p:sp>
+        <p:nvSpPr>
+          <p:cNvPr id="52" name="TextBox 51">
+            <a:extLst>
+              <a:ext uri="{FF2B5EF4-FFF2-40B4-BE49-F238E27FC236}">
+                <a16:creationId xmlns:a16="http://schemas.microsoft.com/office/drawing/2014/main" id="{1F181C16-CE4F-49FE-9E24-C0903923EDF1}"/>
+              </a:ext>
+            </a:extLst>
+          </p:cNvPr>
+          <p:cNvSpPr txBox="1"/>
+          <p:nvPr/>
+        </p:nvSpPr>
+        <p:spPr>
+          <a:xfrm>
+            <a:off x="8993948" y="2585933"/>
+            <a:ext cx="2256769" cy="307777"/>
+          </a:xfrm>
+          <a:prstGeom prst="rect">
+            <a:avLst/>
+          </a:prstGeom>
+          <a:noFill/>
+        </p:spPr>
+        <p:txBody>
+          <a:bodyPr wrap="square" rtlCol="0">
+            <a:spAutoFit/>
+          </a:bodyPr>
+          <a:lstStyle/>
+          <a:p>
+            <a:r>
+              <a:rPr lang="en-US" sz="1400" dirty="0"/>
+              <a:t>7. Get data</a:t>
+            </a:r>
+          </a:p>
+        </p:txBody>
+      </p:sp>
+      <p:sp>
+        <p:nvSpPr>
+          <p:cNvPr id="54" name="Arrow: Right 53">
+            <a:extLst>
+              <a:ext uri="{FF2B5EF4-FFF2-40B4-BE49-F238E27FC236}">
+                <a16:creationId xmlns:a16="http://schemas.microsoft.com/office/drawing/2014/main" id="{16A50168-B067-4F15-A9B9-EFBE8940DEBB}"/>
+              </a:ext>
+            </a:extLst>
+          </p:cNvPr>
+          <p:cNvSpPr/>
+          <p:nvPr/>
+        </p:nvSpPr>
+        <p:spPr>
+          <a:xfrm rot="5400000">
+            <a:off x="7340765" y="3588412"/>
+            <a:ext cx="891396" cy="412069"/>
+          </a:xfrm>
+          <a:prstGeom prst="rightArrow">
+            <a:avLst/>
+          </a:prstGeom>
+          <a:solidFill>
+            <a:schemeClr val="accent1">
+              <a:lumMod val="40000"/>
+              <a:lumOff val="60000"/>
+            </a:schemeClr>
+          </a:solidFill>
+        </p:spPr>
+        <p:style>
+          <a:lnRef idx="2">
+            <a:schemeClr val="accent1">
+              <a:shade val="50000"/>
+            </a:schemeClr>
+          </a:lnRef>
+          <a:fillRef idx="1">
+            <a:schemeClr val="accent1"/>
+          </a:fillRef>
+          <a:effectRef idx="0">
+            <a:schemeClr val="accent1"/>
+          </a:effectRef>
+          <a:fontRef idx="minor">
+            <a:schemeClr val="lt1"/>
+          </a:fontRef>
+        </p:style>
+        <p:txBody>
+          <a:bodyPr rtlCol="0" anchor="ctr"/>
+          <a:lstStyle/>
+          <a:p>
+            <a:pPr algn="ctr"/>
+            <a:endParaRPr lang="en-US"/>
+          </a:p>
+        </p:txBody>
+      </p:sp>
+      <p:sp>
+        <p:nvSpPr>
+          <p:cNvPr id="56" name="Arrow: Right 55">
+            <a:extLst>
+              <a:ext uri="{FF2B5EF4-FFF2-40B4-BE49-F238E27FC236}">
+                <a16:creationId xmlns:a16="http://schemas.microsoft.com/office/drawing/2014/main" id="{9AC2D400-D16C-4707-A00A-E028F7384E7C}"/>
+              </a:ext>
+            </a:extLst>
+          </p:cNvPr>
+          <p:cNvSpPr/>
+          <p:nvPr/>
+        </p:nvSpPr>
+        <p:spPr>
+          <a:xfrm rot="5400000" flipH="1">
+            <a:off x="7849467" y="3588411"/>
+            <a:ext cx="891396" cy="412069"/>
+          </a:xfrm>
+          <a:prstGeom prst="rightArrow">
+            <a:avLst/>
+          </a:prstGeom>
+          <a:solidFill>
+            <a:schemeClr val="accent1">
+              <a:lumMod val="40000"/>
+              <a:lumOff val="60000"/>
+            </a:schemeClr>
+          </a:solidFill>
+        </p:spPr>
+        <p:style>
+          <a:lnRef idx="2">
+            <a:schemeClr val="accent1">
+              <a:shade val="50000"/>
+            </a:schemeClr>
+          </a:lnRef>
+          <a:fillRef idx="1">
+            <a:schemeClr val="accent1"/>
+          </a:fillRef>
+          <a:effectRef idx="0">
+            <a:schemeClr val="accent1"/>
+          </a:effectRef>
+          <a:fontRef idx="minor">
+            <a:schemeClr val="lt1"/>
+          </a:fontRef>
+        </p:style>
+        <p:txBody>
+          <a:bodyPr rtlCol="0" anchor="ctr"/>
+          <a:lstStyle/>
+          <a:p>
+            <a:pPr algn="ctr"/>
+            <a:endParaRPr lang="en-US"/>
+          </a:p>
+        </p:txBody>
+      </p:sp>
+      <p:sp>
+        <p:nvSpPr>
+          <p:cNvPr id="58" name="TextBox 57">
+            <a:extLst>
+              <a:ext uri="{FF2B5EF4-FFF2-40B4-BE49-F238E27FC236}">
+                <a16:creationId xmlns:a16="http://schemas.microsoft.com/office/drawing/2014/main" id="{2FCEA075-833C-42C1-A6FD-DA2FD975C08F}"/>
+              </a:ext>
+            </a:extLst>
+          </p:cNvPr>
+          <p:cNvSpPr txBox="1"/>
+          <p:nvPr/>
+        </p:nvSpPr>
+        <p:spPr>
+          <a:xfrm>
+            <a:off x="6746474" y="3569418"/>
+            <a:ext cx="1164143" cy="523220"/>
+          </a:xfrm>
+          <a:prstGeom prst="rect">
+            <a:avLst/>
+          </a:prstGeom>
+          <a:noFill/>
+        </p:spPr>
+        <p:txBody>
+          <a:bodyPr wrap="square" rtlCol="0">
+            <a:spAutoFit/>
+          </a:bodyPr>
+          <a:lstStyle/>
+          <a:p>
+            <a:r>
+              <a:rPr lang="en-US" sz="1400" dirty="0"/>
+              <a:t>4. Request consent</a:t>
+            </a:r>
+          </a:p>
+        </p:txBody>
+      </p:sp>
+      <p:sp>
+        <p:nvSpPr>
+          <p:cNvPr id="60" name="TextBox 59">
+            <a:extLst>
+              <a:ext uri="{FF2B5EF4-FFF2-40B4-BE49-F238E27FC236}">
+                <a16:creationId xmlns:a16="http://schemas.microsoft.com/office/drawing/2014/main" id="{8998B48E-052B-4044-8FB6-9CE8995697AF}"/>
+              </a:ext>
+            </a:extLst>
+          </p:cNvPr>
+          <p:cNvSpPr txBox="1"/>
+          <p:nvPr/>
+        </p:nvSpPr>
+        <p:spPr>
+          <a:xfrm>
+            <a:off x="8381893" y="3589601"/>
+            <a:ext cx="1164143" cy="523220"/>
+          </a:xfrm>
+          <a:prstGeom prst="rect">
+            <a:avLst/>
+          </a:prstGeom>
+          <a:noFill/>
+        </p:spPr>
+        <p:txBody>
+          <a:bodyPr wrap="square" rtlCol="0">
+            <a:spAutoFit/>
+          </a:bodyPr>
+          <a:lstStyle/>
+          <a:p>
+            <a:r>
+              <a:rPr lang="en-US" sz="1400" dirty="0"/>
+              <a:t>5. Consent credentials</a:t>
+            </a:r>
+          </a:p>
+        </p:txBody>
+      </p:sp>
+      <p:sp>
+        <p:nvSpPr>
+          <p:cNvPr id="70" name="Arrow: Right 69">
+            <a:extLst>
+              <a:ext uri="{FF2B5EF4-FFF2-40B4-BE49-F238E27FC236}">
+                <a16:creationId xmlns:a16="http://schemas.microsoft.com/office/drawing/2014/main" id="{848981BB-6A23-4FF2-A2D5-7082DACA3757}"/>
+              </a:ext>
+            </a:extLst>
+          </p:cNvPr>
+          <p:cNvSpPr/>
+          <p:nvPr/>
+        </p:nvSpPr>
+        <p:spPr>
+          <a:xfrm rot="16200000" flipV="1">
+            <a:off x="10319368" y="3827071"/>
+            <a:ext cx="1971919" cy="412069"/>
+          </a:xfrm>
+          <a:prstGeom prst="rightArrow">
+            <a:avLst/>
+          </a:prstGeom>
+          <a:solidFill>
+            <a:schemeClr val="accent1">
+              <a:lumMod val="40000"/>
+              <a:lumOff val="60000"/>
+            </a:schemeClr>
+          </a:solidFill>
+        </p:spPr>
+        <p:style>
+          <a:lnRef idx="2">
+            <a:schemeClr val="accent1">
+              <a:shade val="50000"/>
+            </a:schemeClr>
+          </a:lnRef>
+          <a:fillRef idx="1">
+            <a:schemeClr val="accent1"/>
+          </a:fillRef>
+          <a:effectRef idx="0">
+            <a:schemeClr val="accent1"/>
+          </a:effectRef>
+          <a:fontRef idx="minor">
+            <a:schemeClr val="lt1"/>
+          </a:fontRef>
+        </p:style>
+        <p:txBody>
+          <a:bodyPr rtlCol="0" anchor="ctr"/>
+          <a:lstStyle/>
+          <a:p>
+            <a:pPr algn="ctr"/>
+            <a:endParaRPr lang="en-US"/>
+          </a:p>
+        </p:txBody>
+      </p:sp>
+      <p:sp>
+        <p:nvSpPr>
+          <p:cNvPr id="72" name="Arrow: Right 71">
+            <a:extLst>
+              <a:ext uri="{FF2B5EF4-FFF2-40B4-BE49-F238E27FC236}">
+                <a16:creationId xmlns:a16="http://schemas.microsoft.com/office/drawing/2014/main" id="{10BD273D-3B2C-47C6-81A3-D2C3E24ABDE3}"/>
+              </a:ext>
+            </a:extLst>
+          </p:cNvPr>
+          <p:cNvSpPr/>
+          <p:nvPr/>
+        </p:nvSpPr>
+        <p:spPr>
+          <a:xfrm rot="16200000" flipH="1" flipV="1">
+            <a:off x="9877924" y="3849276"/>
+            <a:ext cx="1971918" cy="412069"/>
+          </a:xfrm>
+          <a:prstGeom prst="rightArrow">
+            <a:avLst/>
+          </a:prstGeom>
+          <a:solidFill>
+            <a:schemeClr val="accent1">
+              <a:lumMod val="40000"/>
+              <a:lumOff val="60000"/>
+            </a:schemeClr>
+          </a:solidFill>
+        </p:spPr>
+        <p:style>
+          <a:lnRef idx="2">
+            <a:schemeClr val="accent1">
+              <a:shade val="50000"/>
+            </a:schemeClr>
+          </a:lnRef>
+          <a:fillRef idx="1">
+            <a:schemeClr val="accent1"/>
+          </a:fillRef>
+          <a:effectRef idx="0">
+            <a:schemeClr val="accent1"/>
+          </a:effectRef>
+          <a:fontRef idx="minor">
+            <a:schemeClr val="lt1"/>
+          </a:fontRef>
+        </p:style>
+        <p:txBody>
+          <a:bodyPr rtlCol="0" anchor="ctr"/>
+          <a:lstStyle/>
+          <a:p>
+            <a:pPr algn="ctr"/>
+            <a:endParaRPr lang="en-US"/>
+          </a:p>
+        </p:txBody>
+      </p:sp>
+      <p:sp>
+        <p:nvSpPr>
+          <p:cNvPr id="74" name="TextBox 73">
+            <a:extLst>
+              <a:ext uri="{FF2B5EF4-FFF2-40B4-BE49-F238E27FC236}">
+                <a16:creationId xmlns:a16="http://schemas.microsoft.com/office/drawing/2014/main" id="{F16E4369-4BBA-4277-A360-CE72A2DE3DE7}"/>
+              </a:ext>
+            </a:extLst>
+          </p:cNvPr>
+          <p:cNvSpPr txBox="1"/>
+          <p:nvPr/>
+        </p:nvSpPr>
+        <p:spPr>
+          <a:xfrm>
+            <a:off x="11404880" y="3298838"/>
+            <a:ext cx="1164143" cy="523220"/>
+          </a:xfrm>
+          <a:prstGeom prst="rect">
+            <a:avLst/>
+          </a:prstGeom>
+          <a:noFill/>
+        </p:spPr>
+        <p:txBody>
+          <a:bodyPr wrap="square" rtlCol="0">
+            <a:spAutoFit/>
+          </a:bodyPr>
+          <a:lstStyle/>
+          <a:p>
+            <a:r>
+              <a:rPr lang="en-US" sz="1400" dirty="0"/>
+              <a:t>9. Query result</a:t>
+            </a:r>
+          </a:p>
+        </p:txBody>
+      </p:sp>
+      <p:sp>
+        <p:nvSpPr>
+          <p:cNvPr id="76" name="TextBox 75">
+            <a:extLst>
+              <a:ext uri="{FF2B5EF4-FFF2-40B4-BE49-F238E27FC236}">
+                <a16:creationId xmlns:a16="http://schemas.microsoft.com/office/drawing/2014/main" id="{20D39DC5-0C82-4211-A348-34B4C0B636F9}"/>
+              </a:ext>
+            </a:extLst>
+          </p:cNvPr>
+          <p:cNvSpPr txBox="1"/>
+          <p:nvPr/>
+        </p:nvSpPr>
+        <p:spPr>
+          <a:xfrm>
+            <a:off x="10070539" y="3290571"/>
+            <a:ext cx="806517" cy="523220"/>
+          </a:xfrm>
+          <a:prstGeom prst="rect">
+            <a:avLst/>
+          </a:prstGeom>
+          <a:noFill/>
+        </p:spPr>
+        <p:txBody>
+          <a:bodyPr wrap="square" rtlCol="0">
+            <a:spAutoFit/>
+          </a:bodyPr>
+          <a:lstStyle/>
+          <a:p>
+            <a:r>
+              <a:rPr lang="en-US" sz="1400" dirty="0"/>
+              <a:t>8. Data query</a:t>
+            </a:r>
+          </a:p>
+        </p:txBody>
+      </p:sp>
+      <p:sp>
+        <p:nvSpPr>
+          <p:cNvPr id="78" name="TextBox 77">
+            <a:extLst>
+              <a:ext uri="{FF2B5EF4-FFF2-40B4-BE49-F238E27FC236}">
+                <a16:creationId xmlns:a16="http://schemas.microsoft.com/office/drawing/2014/main" id="{475BBDB7-E1D5-4C2E-98D2-2A439025CA06}"/>
+              </a:ext>
+            </a:extLst>
+          </p:cNvPr>
+          <p:cNvSpPr txBox="1"/>
+          <p:nvPr/>
+        </p:nvSpPr>
+        <p:spPr>
+          <a:xfrm>
+            <a:off x="108670" y="414959"/>
+            <a:ext cx="5987330" cy="369332"/>
+          </a:xfrm>
+          <a:prstGeom prst="rect">
+            <a:avLst/>
+          </a:prstGeom>
+          <a:solidFill>
+            <a:schemeClr val="accent1">
+              <a:lumMod val="20000"/>
+              <a:lumOff val="80000"/>
+            </a:schemeClr>
+          </a:solidFill>
+        </p:spPr>
+        <p:txBody>
+          <a:bodyPr wrap="square" rtlCol="0">
+            <a:spAutoFit/>
+          </a:bodyPr>
+          <a:lstStyle/>
+          <a:p>
+            <a:pPr algn="ctr"/>
+            <a:r>
+              <a:rPr lang="en-US" dirty="0">
+                <a:solidFill>
+                  <a:schemeClr val="accent1">
+                    <a:lumMod val="75000"/>
+                  </a:schemeClr>
+                </a:solidFill>
+              </a:rPr>
+              <a:t>Power Platform Back-End Cluster</a:t>
+            </a:r>
+          </a:p>
+        </p:txBody>
+      </p:sp>
+      <p:sp>
+        <p:nvSpPr>
+          <p:cNvPr id="4" name="TextBox 3">
+            <a:extLst>
+              <a:ext uri="{FF2B5EF4-FFF2-40B4-BE49-F238E27FC236}">
+                <a16:creationId xmlns:a16="http://schemas.microsoft.com/office/drawing/2014/main" id="{CC48FDB7-3678-4E41-ABB6-C552C34A8246}"/>
+              </a:ext>
+            </a:extLst>
+          </p:cNvPr>
+          <p:cNvSpPr txBox="1"/>
+          <p:nvPr/>
+        </p:nvSpPr>
+        <p:spPr>
+          <a:xfrm>
+            <a:off x="1093376" y="1519022"/>
+            <a:ext cx="2007892" cy="1754326"/>
+          </a:xfrm>
+          <a:prstGeom prst="rect">
+            <a:avLst/>
+          </a:prstGeom>
+          <a:solidFill>
+            <a:schemeClr val="accent1"/>
+          </a:solidFill>
+        </p:spPr>
+        <p:txBody>
+          <a:bodyPr wrap="square" rtlCol="0">
+            <a:spAutoFit/>
+          </a:bodyPr>
+          <a:lstStyle/>
+          <a:p>
+            <a:pPr algn="ctr"/>
+            <a:endParaRPr lang="en-US" dirty="0">
+              <a:solidFill>
+                <a:schemeClr val="bg2"/>
+              </a:solidFill>
+            </a:endParaRPr>
+          </a:p>
+          <a:p>
+            <a:pPr algn="ctr"/>
+            <a:endParaRPr lang="en-US" dirty="0">
+              <a:solidFill>
+                <a:schemeClr val="bg2"/>
+              </a:solidFill>
+            </a:endParaRPr>
+          </a:p>
+          <a:p>
+            <a:pPr algn="ctr"/>
+            <a:r>
+              <a:rPr lang="en-US" dirty="0">
+                <a:solidFill>
+                  <a:schemeClr val="bg2"/>
+                </a:solidFill>
+              </a:rPr>
+              <a:t>Back-End Services</a:t>
+            </a:r>
+          </a:p>
+          <a:p>
+            <a:pPr algn="ctr"/>
+            <a:r>
+              <a:rPr lang="en-US" dirty="0">
+                <a:solidFill>
+                  <a:schemeClr val="bg2"/>
+                </a:solidFill>
+              </a:rPr>
+              <a:t>(private)</a:t>
+            </a:r>
+          </a:p>
+          <a:p>
+            <a:pPr algn="ctr"/>
+            <a:endParaRPr lang="en-US" dirty="0">
+              <a:solidFill>
+                <a:schemeClr val="bg2"/>
+              </a:solidFill>
+            </a:endParaRPr>
+          </a:p>
+          <a:p>
+            <a:pPr algn="ctr"/>
+            <a:endParaRPr lang="en-US" dirty="0">
+              <a:solidFill>
+                <a:schemeClr val="bg2"/>
+              </a:solidFill>
+            </a:endParaRPr>
+          </a:p>
+        </p:txBody>
+      </p:sp>
+    </p:spTree>
+    <p:extLst>
+      <p:ext uri="{BB962C8B-B14F-4D97-AF65-F5344CB8AC3E}">
+        <p14:creationId xmlns:p14="http://schemas.microsoft.com/office/powerpoint/2010/main" val="4163777643"/>
       </p:ext>
     </p:extLst>
   </p:cSld>

</xml_diff>